<commit_message>
Just before the pitch!
</commit_message>
<xml_diff>
--- a/Slides.pptx
+++ b/Slides.pptx
@@ -5,7 +5,13 @@
     <p:sldMasterId id="2147483660" r:id="rId1"/>
   </p:sldMasterIdLst>
   <p:sldIdLst>
-    <p:sldId id="256" r:id="rId2"/>
+    <p:sldId id="261" r:id="rId2"/>
+    <p:sldId id="264" r:id="rId3"/>
+    <p:sldId id="257" r:id="rId4"/>
+    <p:sldId id="269" r:id="rId5"/>
+    <p:sldId id="260" r:id="rId6"/>
+    <p:sldId id="266" r:id="rId7"/>
+    <p:sldId id="267" r:id="rId8"/>
   </p:sldIdLst>
   <p:sldSz cx="12192000" cy="6858000"/>
   <p:notesSz cx="6858000" cy="9144000"/>
@@ -104,6 +110,22 @@
       </a:defRPr>
     </a:lvl9pPr>
   </p:defaultTextStyle>
+  <p:extLst>
+    <p:ext uri="{EFAFB233-063F-42B5-8137-9DF3F51BA10A}">
+      <p15:sldGuideLst xmlns:p15="http://schemas.microsoft.com/office/powerpoint/2012/main">
+        <p15:guide id="1" orient="horz" pos="2160">
+          <p15:clr>
+            <a:srgbClr val="A4A3A4"/>
+          </p15:clr>
+        </p15:guide>
+        <p15:guide id="2" pos="3840">
+          <p15:clr>
+            <a:srgbClr val="A4A3A4"/>
+          </p15:clr>
+        </p15:guide>
+      </p15:sldGuideLst>
+    </p:ext>
+  </p:extLst>
 </p:presentation>
 </file>
 
@@ -3814,124 +3836,171 @@
             <a:spLocks noGrp="1"/>
           </p:cNvSpPr>
           <p:nvPr>
-            <p:ph type="ctrTitle"/>
+            <p:ph type="title"/>
           </p:nvPr>
         </p:nvSpPr>
         <p:spPr>
           <a:xfrm>
-            <a:off x="2311454" y="574159"/>
-            <a:ext cx="8637073" cy="1323543"/>
+            <a:off x="0" y="5571456"/>
+            <a:ext cx="5393831" cy="1286544"/>
           </a:xfrm>
         </p:spPr>
         <p:txBody>
           <a:bodyPr/>
           <a:lstStyle/>
           <a:p>
-            <a:r>
-              <a:rPr lang="en-US" dirty="0"/>
-              <a:t>Tech “Pen” PALS</a:t>
-            </a:r>
-          </a:p>
-        </p:txBody>
-      </p:sp>
-      <p:sp>
-        <p:nvSpPr>
-          <p:cNvPr id="3" name="Subtitle 2"/>
-          <p:cNvSpPr>
-            <a:spLocks noGrp="1"/>
-          </p:cNvSpPr>
-          <p:nvPr>
-            <p:ph type="subTitle" idx="1"/>
-          </p:nvPr>
-        </p:nvSpPr>
-        <p:spPr>
-          <a:xfrm>
-            <a:off x="2311455" y="2085177"/>
-            <a:ext cx="8637072" cy="2231643"/>
-          </a:xfrm>
-        </p:spPr>
-        <p:txBody>
-          <a:bodyPr>
-            <a:normAutofit fontScale="77500" lnSpcReduction="20000"/>
-          </a:bodyPr>
-          <a:lstStyle/>
-          <a:p>
-            <a:r>
-              <a:rPr lang="en-US" b="1" dirty="0"/>
-              <a:t>Facilitating Unlikely Connections Through Real Work</a:t>
-            </a:r>
-          </a:p>
-          <a:p>
-            <a:endParaRPr lang="en-US" dirty="0"/>
-          </a:p>
-          <a:p>
-            <a:r>
-              <a:rPr lang="en-US" dirty="0"/>
-              <a:t>TEAM:</a:t>
-            </a:r>
-          </a:p>
-          <a:p>
-            <a:r>
-              <a:rPr lang="en-US" dirty="0"/>
-              <a:t>MADLENE HAMILTON </a:t>
-            </a:r>
-            <a:r>
-              <a:rPr lang="en-US" dirty="0">
+            <a:br>
+              <a:rPr lang="en-US" sz="4800" b="1" dirty="0">
+                <a:latin typeface="Calibri"/>
+                <a:cs typeface="Calibri"/>
+              </a:rPr>
+            </a:br>
+            <a:r>
+              <a:rPr lang="en-US" sz="1800" b="1" dirty="0">
+                <a:latin typeface="Calibri"/>
+                <a:cs typeface="Calibri"/>
+              </a:rPr>
+              <a:t>Madlene Hamilton </a:t>
+            </a:r>
+            <a:r>
+              <a:rPr lang="en-US" sz="1800" b="1" dirty="0">
+                <a:latin typeface="Calibri"/>
+                <a:cs typeface="Calibri"/>
                 <a:hlinkClick r:id="rId2"/>
               </a:rPr>
               <a:t>MADLENEH@gmail.com</a:t>
             </a:r>
             <a:r>
-              <a:rPr lang="en-US" dirty="0"/>
+              <a:rPr lang="en-US" sz="1800" b="1" dirty="0">
+                <a:latin typeface="Calibri"/>
+                <a:cs typeface="Calibri"/>
+              </a:rPr>
               <a:t> </a:t>
             </a:r>
-          </a:p>
-          <a:p>
-            <a:r>
-              <a:rPr lang="en-US" dirty="0" err="1"/>
+            <a:br>
+              <a:rPr lang="en-US" sz="1800" b="1" dirty="0">
+                <a:latin typeface="Calibri"/>
+                <a:cs typeface="Calibri"/>
+              </a:rPr>
+            </a:br>
+            <a:r>
+              <a:rPr lang="en-US" sz="1800" b="1" dirty="0" err="1">
+                <a:latin typeface="Calibri"/>
+                <a:cs typeface="Calibri"/>
+              </a:rPr>
               <a:t>Pragyansmita</a:t>
             </a:r>
             <a:r>
-              <a:rPr lang="en-US" dirty="0"/>
+              <a:rPr lang="en-US" sz="1800" b="1" dirty="0">
+                <a:latin typeface="Calibri"/>
+                <a:cs typeface="Calibri"/>
+              </a:rPr>
               <a:t> </a:t>
             </a:r>
             <a:r>
-              <a:rPr lang="en-US" dirty="0" err="1"/>
+              <a:rPr lang="en-US" sz="1800" b="1" dirty="0" err="1">
+                <a:latin typeface="Calibri"/>
+                <a:cs typeface="Calibri"/>
+              </a:rPr>
               <a:t>Nayak</a:t>
             </a:r>
             <a:r>
-              <a:rPr lang="en-US" dirty="0"/>
+              <a:rPr lang="en-US" sz="1800" b="1" dirty="0">
+                <a:latin typeface="Calibri"/>
+                <a:cs typeface="Calibri"/>
+              </a:rPr>
               <a:t> </a:t>
             </a:r>
             <a:r>
-              <a:rPr lang="en-US" dirty="0">
+              <a:rPr lang="en-US" sz="1800" b="1" dirty="0">
+                <a:latin typeface="Calibri"/>
+                <a:cs typeface="Calibri"/>
                 <a:hlinkClick r:id="rId3"/>
               </a:rPr>
               <a:t>pragyansmita@gmail.com</a:t>
             </a:r>
-            <a:endParaRPr lang="en-US" dirty="0"/>
-          </a:p>
-          <a:p>
-            <a:r>
-              <a:rPr lang="en-US" dirty="0"/>
-              <a:t>(Ideas also contributed by TAMMY BARBIE)</a:t>
-            </a:r>
-          </a:p>
-          <a:p>
-            <a:endParaRPr lang="en-US" dirty="0"/>
-          </a:p>
-        </p:txBody>
-      </p:sp>
-      <p:sp>
-        <p:nvSpPr>
-          <p:cNvPr id="4" name="TextBox 3"/>
+            <a:br>
+              <a:rPr lang="en-US" sz="1800" b="1" dirty="0">
+                <a:latin typeface="Calibri"/>
+                <a:cs typeface="Calibri"/>
+              </a:rPr>
+            </a:br>
+            <a:r>
+              <a:rPr lang="en-US" sz="1800" b="1" dirty="0">
+                <a:latin typeface="Calibri"/>
+                <a:cs typeface="Calibri"/>
+              </a:rPr>
+              <a:t>(Ideas also contributed by Tammy Barbie</a:t>
+            </a:r>
+          </a:p>
+        </p:txBody>
+      </p:sp>
+      <p:sp>
+        <p:nvSpPr>
+          <p:cNvPr id="4" name="Text Placeholder 3"/>
+          <p:cNvSpPr>
+            <a:spLocks noGrp="1"/>
+          </p:cNvSpPr>
+          <p:nvPr>
+            <p:ph type="body" sz="half" idx="2"/>
+          </p:nvPr>
+        </p:nvSpPr>
+        <p:spPr>
+          <a:xfrm>
+            <a:off x="5274988" y="5941897"/>
+            <a:ext cx="6917012" cy="916103"/>
+          </a:xfrm>
+        </p:spPr>
+        <p:txBody>
+          <a:bodyPr>
+            <a:normAutofit lnSpcReduction="10000"/>
+          </a:bodyPr>
+          <a:lstStyle/>
+          <a:p>
+            <a:pPr algn="ctr"/>
+            <a:endParaRPr lang="en-US" sz="1800" dirty="0"/>
+          </a:p>
+          <a:p>
+            <a:pPr algn="r"/>
+            <a:r>
+              <a:rPr lang="en-US" sz="1800" dirty="0"/>
+              <a:t>Women in Tech Demo Day (Angel Hack, Capital One)</a:t>
+            </a:r>
+          </a:p>
+          <a:p>
+            <a:pPr algn="r"/>
+            <a:r>
+              <a:rPr lang="en-US" sz="1800" dirty="0"/>
+              <a:t>27</a:t>
+            </a:r>
+            <a:r>
+              <a:rPr lang="en-US" sz="1800" baseline="30000" dirty="0"/>
+              <a:t>th</a:t>
+            </a:r>
+            <a:r>
+              <a:rPr lang="en-US" sz="1800" dirty="0"/>
+              <a:t> August, 2016</a:t>
+            </a:r>
+          </a:p>
+          <a:p>
+            <a:endParaRPr lang="en-US" dirty="0"/>
+          </a:p>
+          <a:p>
+            <a:pPr algn="ctr"/>
+            <a:endParaRPr lang="en-US" dirty="0"/>
+          </a:p>
+        </p:txBody>
+      </p:sp>
+      <p:sp>
+        <p:nvSpPr>
+          <p:cNvPr id="8" name="TextBox 7"/>
           <p:cNvSpPr txBox="1"/>
           <p:nvPr/>
         </p:nvSpPr>
         <p:spPr>
           <a:xfrm>
-            <a:off x="1924493" y="4720856"/>
-            <a:ext cx="9024033" cy="1077218"/>
+            <a:off x="2145733" y="5095140"/>
+            <a:ext cx="8174223" cy="830997"/>
           </a:xfrm>
           <a:prstGeom prst="rect">
             <a:avLst/>
@@ -3946,39 +4015,1025 @@
           <a:p>
             <a:pPr algn="ctr"/>
             <a:r>
-              <a:rPr lang="en-US" sz="3200" dirty="0">
-                <a:latin typeface="+mj-lt"/>
-              </a:rPr>
-              <a:t>Women in Tech Demo Day (Angel Hack, Capital One)</a:t>
-            </a:r>
-          </a:p>
-          <a:p>
-            <a:pPr algn="ctr"/>
-            <a:r>
-              <a:rPr lang="en-US" sz="3200" dirty="0">
-                <a:latin typeface="+mj-lt"/>
-              </a:rPr>
-              <a:t>27</a:t>
-            </a:r>
-            <a:r>
-              <a:rPr lang="en-US" sz="3200" baseline="30000" dirty="0">
-                <a:latin typeface="+mj-lt"/>
-              </a:rPr>
-              <a:t>th</a:t>
-            </a:r>
-            <a:r>
-              <a:rPr lang="en-US" sz="3200" dirty="0">
-                <a:latin typeface="+mj-lt"/>
-              </a:rPr>
-              <a:t> August, 2016</a:t>
-            </a:r>
-          </a:p>
-        </p:txBody>
-      </p:sp>
+              <a:rPr lang="en-US" sz="4800" dirty="0"/>
+              <a:t>Tech “Pen” PALS</a:t>
+            </a:r>
+          </a:p>
+        </p:txBody>
+      </p:sp>
+      <p:pic>
+        <p:nvPicPr>
+          <p:cNvPr id="15" name="Picture Placeholder 14"/>
+          <p:cNvPicPr>
+            <a:picLocks noGrp="1" noChangeAspect="1"/>
+          </p:cNvPicPr>
+          <p:nvPr>
+            <p:ph type="pic" idx="1"/>
+          </p:nvPr>
+        </p:nvPicPr>
+        <p:blipFill>
+          <a:blip r:embed="rId4"/>
+          <a:srcRect t="23125" b="23125"/>
+          <a:stretch>
+            <a:fillRect/>
+          </a:stretch>
+        </p:blipFill>
+        <p:spPr/>
+      </p:pic>
     </p:spTree>
     <p:extLst>
       <p:ext uri="{BB962C8B-B14F-4D97-AF65-F5344CB8AC3E}">
-        <p14:creationId xmlns:p14="http://schemas.microsoft.com/office/powerpoint/2010/main" val="3202701624"/>
+        <p14:creationId xmlns:p14="http://schemas.microsoft.com/office/powerpoint/2010/main" val="2960442306"/>
+      </p:ext>
+    </p:extLst>
+  </p:cSld>
+  <p:clrMapOvr>
+    <a:masterClrMapping/>
+  </p:clrMapOvr>
+</p:sld>
+</file>
+
+<file path=ppt/slides/slide2.xml><?xml version="1.0" encoding="utf-8"?>
+<p:sld xmlns:a="http://schemas.openxmlformats.org/drawingml/2006/main" xmlns:r="http://schemas.openxmlformats.org/officeDocument/2006/relationships" xmlns:p="http://schemas.openxmlformats.org/presentationml/2006/main">
+  <p:cSld>
+    <p:spTree>
+      <p:nvGrpSpPr>
+        <p:cNvPr id="1" name=""/>
+        <p:cNvGrpSpPr/>
+        <p:nvPr/>
+      </p:nvGrpSpPr>
+      <p:grpSpPr>
+        <a:xfrm>
+          <a:off x="0" y="0"/>
+          <a:ext cx="0" cy="0"/>
+          <a:chOff x="0" y="0"/>
+          <a:chExt cx="0" cy="0"/>
+        </a:xfrm>
+      </p:grpSpPr>
+      <p:sp>
+        <p:nvSpPr>
+          <p:cNvPr id="2" name="Title 1"/>
+          <p:cNvSpPr>
+            <a:spLocks noGrp="1"/>
+          </p:cNvSpPr>
+          <p:nvPr>
+            <p:ph type="title"/>
+          </p:nvPr>
+        </p:nvSpPr>
+        <p:spPr/>
+        <p:txBody>
+          <a:bodyPr/>
+          <a:lstStyle/>
+          <a:p>
+            <a:r>
+              <a:rPr lang="en-US" dirty="0"/>
+              <a:t>Problem</a:t>
+            </a:r>
+          </a:p>
+        </p:txBody>
+      </p:sp>
+      <p:sp>
+        <p:nvSpPr>
+          <p:cNvPr id="3" name="Content Placeholder 2"/>
+          <p:cNvSpPr>
+            <a:spLocks noGrp="1"/>
+          </p:cNvSpPr>
+          <p:nvPr>
+            <p:ph idx="1"/>
+          </p:nvPr>
+        </p:nvSpPr>
+        <p:spPr/>
+        <p:txBody>
+          <a:bodyPr>
+            <a:normAutofit/>
+          </a:bodyPr>
+          <a:lstStyle/>
+          <a:p>
+            <a:pPr>
+              <a:buFont typeface="Wingdings" charset="2"/>
+              <a:buChar char="u"/>
+            </a:pPr>
+            <a:r>
+              <a:rPr lang="en-US" sz="3600" dirty="0"/>
+              <a:t>According to Deloitte, in 2015, less than 25% of IT jobs were held by women globally. </a:t>
+            </a:r>
+          </a:p>
+          <a:p>
+            <a:pPr>
+              <a:buFont typeface="Wingdings" charset="2"/>
+              <a:buChar char="u"/>
+            </a:pPr>
+            <a:r>
+              <a:rPr lang="en-US" sz="3600" dirty="0"/>
+              <a:t>Four Major Reasons:</a:t>
+            </a:r>
+          </a:p>
+          <a:p>
+            <a:pPr lvl="2">
+              <a:buFont typeface="Wingdings" charset="2"/>
+              <a:buChar char="§"/>
+            </a:pPr>
+            <a:r>
+              <a:rPr lang="en-US" sz="3200" dirty="0">
+                <a:solidFill>
+                  <a:srgbClr val="FF0000"/>
+                </a:solidFill>
+              </a:rPr>
+              <a:t>EDUCATION PIPELINE</a:t>
+            </a:r>
+          </a:p>
+          <a:p>
+            <a:pPr lvl="2">
+              <a:buFont typeface="Wingdings" charset="2"/>
+              <a:buChar char="§"/>
+            </a:pPr>
+            <a:r>
+              <a:rPr lang="en-US" sz="3200" dirty="0"/>
+              <a:t>Recruiting and hiring processes</a:t>
+            </a:r>
+          </a:p>
+          <a:p>
+            <a:pPr lvl="2">
+              <a:buFont typeface="Wingdings" charset="2"/>
+              <a:buChar char="§"/>
+            </a:pPr>
+            <a:r>
+              <a:rPr lang="en-US" sz="3200" dirty="0"/>
+              <a:t>Paying and promoting</a:t>
+            </a:r>
+          </a:p>
+          <a:p>
+            <a:pPr lvl="2">
+              <a:buFont typeface="Wingdings" charset="2"/>
+              <a:buChar char="§"/>
+            </a:pPr>
+            <a:r>
+              <a:rPr lang="en-US" sz="3200" dirty="0"/>
+              <a:t>Retention</a:t>
+            </a:r>
+          </a:p>
+          <a:p>
+            <a:endParaRPr lang="en-US" dirty="0"/>
+          </a:p>
+        </p:txBody>
+      </p:sp>
+    </p:spTree>
+    <p:extLst>
+      <p:ext uri="{BB962C8B-B14F-4D97-AF65-F5344CB8AC3E}">
+        <p14:creationId xmlns:p14="http://schemas.microsoft.com/office/powerpoint/2010/main" val="1977204205"/>
+      </p:ext>
+    </p:extLst>
+  </p:cSld>
+  <p:clrMapOvr>
+    <a:masterClrMapping/>
+  </p:clrMapOvr>
+</p:sld>
+</file>
+
+<file path=ppt/slides/slide3.xml><?xml version="1.0" encoding="utf-8"?>
+<p:sld xmlns:a="http://schemas.openxmlformats.org/drawingml/2006/main" xmlns:r="http://schemas.openxmlformats.org/officeDocument/2006/relationships" xmlns:p="http://schemas.openxmlformats.org/presentationml/2006/main">
+  <p:cSld>
+    <p:spTree>
+      <p:nvGrpSpPr>
+        <p:cNvPr id="1" name=""/>
+        <p:cNvGrpSpPr/>
+        <p:nvPr/>
+      </p:nvGrpSpPr>
+      <p:grpSpPr>
+        <a:xfrm>
+          <a:off x="0" y="0"/>
+          <a:ext cx="0" cy="0"/>
+          <a:chOff x="0" y="0"/>
+          <a:chExt cx="0" cy="0"/>
+        </a:xfrm>
+      </p:grpSpPr>
+      <p:sp>
+        <p:nvSpPr>
+          <p:cNvPr id="2" name="Title 1"/>
+          <p:cNvSpPr>
+            <a:spLocks noGrp="1"/>
+          </p:cNvSpPr>
+          <p:nvPr>
+            <p:ph type="title"/>
+          </p:nvPr>
+        </p:nvSpPr>
+        <p:spPr/>
+        <p:txBody>
+          <a:bodyPr/>
+          <a:lstStyle/>
+          <a:p>
+            <a:pPr lvl="2"/>
+            <a:r>
+              <a:rPr lang="en-US" sz="3200" dirty="0"/>
+              <a:t>LEAKEY EDUCATION PIPELINE</a:t>
+            </a:r>
+          </a:p>
+        </p:txBody>
+      </p:sp>
+      <p:sp>
+        <p:nvSpPr>
+          <p:cNvPr id="3" name="Content Placeholder 2"/>
+          <p:cNvSpPr>
+            <a:spLocks noGrp="1"/>
+          </p:cNvSpPr>
+          <p:nvPr>
+            <p:ph idx="1"/>
+          </p:nvPr>
+        </p:nvSpPr>
+        <p:spPr/>
+        <p:txBody>
+          <a:bodyPr>
+            <a:normAutofit/>
+          </a:bodyPr>
+          <a:lstStyle/>
+          <a:p>
+            <a:pPr algn="ctr"/>
+            <a:r>
+              <a:rPr lang="en-US" dirty="0"/>
+              <a:t>“</a:t>
+            </a:r>
+            <a:r>
+              <a:rPr lang="en-US" sz="2900" dirty="0" err="1"/>
+              <a:t>Linkedin</a:t>
+            </a:r>
+            <a:r>
+              <a:rPr lang="en-US" sz="2900" dirty="0"/>
+              <a:t>” for girls who are interested in technology but may not know it yet. </a:t>
+            </a:r>
+            <a:endParaRPr lang="en-US" dirty="0"/>
+          </a:p>
+          <a:p>
+            <a:pPr>
+              <a:buFont typeface="Wingdings" charset="2"/>
+              <a:buChar char="u"/>
+            </a:pPr>
+            <a:r>
+              <a:rPr lang="en-US" sz="2400" dirty="0"/>
+              <a:t>Build relationships between unlikely allies</a:t>
+            </a:r>
+          </a:p>
+          <a:p>
+            <a:pPr lvl="1">
+              <a:buFont typeface="Wingdings" charset="2"/>
+              <a:buChar char="§"/>
+            </a:pPr>
+            <a:r>
+              <a:rPr lang="en-US" sz="2400" dirty="0"/>
+              <a:t>Matches girls in emerging, rural, and remote areas to technology professionals</a:t>
+            </a:r>
+          </a:p>
+          <a:p>
+            <a:pPr>
+              <a:buFont typeface="Wingdings" charset="2"/>
+              <a:buChar char="u"/>
+            </a:pPr>
+            <a:r>
+              <a:rPr lang="en-US" sz="2400" dirty="0"/>
+              <a:t>Educate girls on professional and market opportunities in technology</a:t>
+            </a:r>
+          </a:p>
+          <a:p>
+            <a:pPr lvl="1">
+              <a:buFont typeface="Wingdings" charset="2"/>
+              <a:buChar char="§"/>
+            </a:pPr>
+            <a:r>
+              <a:rPr lang="en-US" sz="2400" dirty="0"/>
+              <a:t>STEM/Coding Project Platform</a:t>
+            </a:r>
+          </a:p>
+          <a:p>
+            <a:pPr>
+              <a:buFont typeface="Wingdings" charset="2"/>
+              <a:buChar char="u"/>
+            </a:pPr>
+            <a:r>
+              <a:rPr lang="en-US" sz="2400" dirty="0"/>
+              <a:t>Provide hands on real world exposure to technology jobs</a:t>
+            </a:r>
+          </a:p>
+          <a:p>
+            <a:pPr lvl="1">
+              <a:buFont typeface="Wingdings" charset="2"/>
+              <a:buChar char="§"/>
+            </a:pPr>
+            <a:r>
+              <a:rPr lang="en-US" sz="2400" dirty="0"/>
+              <a:t>Go beyond social and incorporates educational tools</a:t>
+            </a:r>
+          </a:p>
+          <a:p>
+            <a:pPr lvl="1">
+              <a:buFont typeface="Wingdings" charset="2"/>
+              <a:buChar char="u"/>
+            </a:pPr>
+            <a:endParaRPr lang="en-US" dirty="0"/>
+          </a:p>
+          <a:p>
+            <a:pPr>
+              <a:buFont typeface="Wingdings" charset="2"/>
+              <a:buChar char="u"/>
+            </a:pPr>
+            <a:endParaRPr lang="en-US" dirty="0"/>
+          </a:p>
+          <a:p>
+            <a:pPr>
+              <a:buFont typeface="Wingdings" charset="2"/>
+              <a:buChar char="u"/>
+            </a:pPr>
+            <a:endParaRPr lang="en-US" dirty="0"/>
+          </a:p>
+          <a:p>
+            <a:endParaRPr lang="en-US" dirty="0"/>
+          </a:p>
+        </p:txBody>
+      </p:sp>
+    </p:spTree>
+    <p:extLst>
+      <p:ext uri="{BB962C8B-B14F-4D97-AF65-F5344CB8AC3E}">
+        <p14:creationId xmlns:p14="http://schemas.microsoft.com/office/powerpoint/2010/main" val="3221148327"/>
+      </p:ext>
+    </p:extLst>
+  </p:cSld>
+  <p:clrMapOvr>
+    <a:masterClrMapping/>
+  </p:clrMapOvr>
+</p:sld>
+</file>
+
+<file path=ppt/slides/slide4.xml><?xml version="1.0" encoding="utf-8"?>
+<p:sld xmlns:a="http://schemas.openxmlformats.org/drawingml/2006/main" xmlns:r="http://schemas.openxmlformats.org/officeDocument/2006/relationships" xmlns:p="http://schemas.openxmlformats.org/presentationml/2006/main">
+  <p:cSld>
+    <p:spTree>
+      <p:nvGrpSpPr>
+        <p:cNvPr id="1" name=""/>
+        <p:cNvGrpSpPr/>
+        <p:nvPr/>
+      </p:nvGrpSpPr>
+      <p:grpSpPr>
+        <a:xfrm>
+          <a:off x="0" y="0"/>
+          <a:ext cx="0" cy="0"/>
+          <a:chOff x="0" y="0"/>
+          <a:chExt cx="0" cy="0"/>
+        </a:xfrm>
+      </p:grpSpPr>
+      <p:pic>
+        <p:nvPicPr>
+          <p:cNvPr id="2" name="Picture 1" descr="screen1.png"/>
+          <p:cNvPicPr>
+            <a:picLocks noChangeAspect="1"/>
+          </p:cNvPicPr>
+          <p:nvPr/>
+        </p:nvPicPr>
+        <p:blipFill>
+          <a:blip r:embed="rId2">
+            <a:extLst>
+              <a:ext uri="{28A0092B-C50C-407E-A947-70E740481C1C}">
+                <a14:useLocalDpi xmlns:a14="http://schemas.microsoft.com/office/drawing/2010/main" val="0"/>
+              </a:ext>
+            </a:extLst>
+          </a:blip>
+          <a:stretch>
+            <a:fillRect/>
+          </a:stretch>
+        </p:blipFill>
+        <p:spPr>
+          <a:xfrm>
+            <a:off x="1676400" y="101600"/>
+            <a:ext cx="8208799" cy="6180951"/>
+          </a:xfrm>
+          <a:prstGeom prst="rect">
+            <a:avLst/>
+          </a:prstGeom>
+        </p:spPr>
+      </p:pic>
+    </p:spTree>
+    <p:extLst>
+      <p:ext uri="{BB962C8B-B14F-4D97-AF65-F5344CB8AC3E}">
+        <p14:creationId xmlns:p14="http://schemas.microsoft.com/office/powerpoint/2010/main" val="2989718777"/>
+      </p:ext>
+    </p:extLst>
+  </p:cSld>
+  <p:clrMapOvr>
+    <a:masterClrMapping/>
+  </p:clrMapOvr>
+</p:sld>
+</file>
+
+<file path=ppt/slides/slide5.xml><?xml version="1.0" encoding="utf-8"?>
+<p:sld xmlns:a="http://schemas.openxmlformats.org/drawingml/2006/main" xmlns:r="http://schemas.openxmlformats.org/officeDocument/2006/relationships" xmlns:p="http://schemas.openxmlformats.org/presentationml/2006/main">
+  <p:cSld>
+    <p:spTree>
+      <p:nvGrpSpPr>
+        <p:cNvPr id="1" name=""/>
+        <p:cNvGrpSpPr/>
+        <p:nvPr/>
+      </p:nvGrpSpPr>
+      <p:grpSpPr>
+        <a:xfrm>
+          <a:off x="0" y="0"/>
+          <a:ext cx="0" cy="0"/>
+          <a:chOff x="0" y="0"/>
+          <a:chExt cx="0" cy="0"/>
+        </a:xfrm>
+      </p:grpSpPr>
+      <p:sp>
+        <p:nvSpPr>
+          <p:cNvPr id="2" name="Title 1"/>
+          <p:cNvSpPr>
+            <a:spLocks noGrp="1"/>
+          </p:cNvSpPr>
+          <p:nvPr>
+            <p:ph type="title"/>
+          </p:nvPr>
+        </p:nvSpPr>
+        <p:spPr/>
+        <p:txBody>
+          <a:bodyPr/>
+          <a:lstStyle/>
+          <a:p>
+            <a:r>
+              <a:rPr lang="en-US" b="1" dirty="0">
+                <a:solidFill>
+                  <a:schemeClr val="tx1"/>
+                </a:solidFill>
+              </a:rPr>
+              <a:t>Market (US, International)</a:t>
+            </a:r>
+          </a:p>
+        </p:txBody>
+      </p:sp>
+      <p:sp>
+        <p:nvSpPr>
+          <p:cNvPr id="3" name="Text Placeholder 2"/>
+          <p:cNvSpPr>
+            <a:spLocks noGrp="1"/>
+          </p:cNvSpPr>
+          <p:nvPr>
+            <p:ph type="body" idx="1"/>
+          </p:nvPr>
+        </p:nvSpPr>
+        <p:spPr/>
+        <p:txBody>
+          <a:bodyPr/>
+          <a:lstStyle/>
+          <a:p>
+            <a:pPr algn="ctr"/>
+            <a:r>
+              <a:rPr lang="en-US" b="1" dirty="0">
+                <a:solidFill>
+                  <a:schemeClr val="tx1"/>
+                </a:solidFill>
+              </a:rPr>
+              <a:t>Potential Partners</a:t>
+            </a:r>
+          </a:p>
+        </p:txBody>
+      </p:sp>
+      <p:sp>
+        <p:nvSpPr>
+          <p:cNvPr id="4" name="Content Placeholder 3"/>
+          <p:cNvSpPr>
+            <a:spLocks noGrp="1"/>
+          </p:cNvSpPr>
+          <p:nvPr>
+            <p:ph sz="half" idx="2"/>
+          </p:nvPr>
+        </p:nvSpPr>
+        <p:spPr/>
+        <p:txBody>
+          <a:bodyPr/>
+          <a:lstStyle/>
+          <a:p>
+            <a:pPr>
+              <a:buFont typeface="Wingdings" charset="2"/>
+              <a:buChar char="u"/>
+            </a:pPr>
+            <a:r>
+              <a:rPr lang="en-US" dirty="0"/>
+              <a:t>Corporations</a:t>
+            </a:r>
+          </a:p>
+          <a:p>
+            <a:pPr>
+              <a:buFont typeface="Wingdings" charset="2"/>
+              <a:buChar char="u"/>
+            </a:pPr>
+            <a:r>
+              <a:rPr lang="en-US" dirty="0"/>
+              <a:t>Governments</a:t>
+            </a:r>
+          </a:p>
+          <a:p>
+            <a:pPr>
+              <a:buFont typeface="Wingdings" charset="2"/>
+              <a:buChar char="u"/>
+            </a:pPr>
+            <a:r>
+              <a:rPr lang="en-US" dirty="0"/>
+              <a:t>NGOs</a:t>
+            </a:r>
+          </a:p>
+          <a:p>
+            <a:pPr>
+              <a:buFont typeface="Wingdings" charset="2"/>
+              <a:buChar char="u"/>
+            </a:pPr>
+            <a:endParaRPr lang="en-US" dirty="0"/>
+          </a:p>
+          <a:p>
+            <a:pPr>
+              <a:buFont typeface="Wingdings" charset="2"/>
+              <a:buChar char="u"/>
+            </a:pPr>
+            <a:endParaRPr lang="en-US" dirty="0"/>
+          </a:p>
+          <a:p>
+            <a:pPr>
+              <a:buFont typeface="Wingdings" charset="2"/>
+              <a:buChar char="u"/>
+            </a:pPr>
+            <a:endParaRPr lang="en-US" dirty="0"/>
+          </a:p>
+        </p:txBody>
+      </p:sp>
+      <p:sp>
+        <p:nvSpPr>
+          <p:cNvPr id="5" name="Text Placeholder 4"/>
+          <p:cNvSpPr>
+            <a:spLocks noGrp="1"/>
+          </p:cNvSpPr>
+          <p:nvPr>
+            <p:ph type="body" sz="quarter" idx="3"/>
+          </p:nvPr>
+        </p:nvSpPr>
+        <p:spPr/>
+        <p:txBody>
+          <a:bodyPr/>
+          <a:lstStyle/>
+          <a:p>
+            <a:pPr algn="ctr"/>
+            <a:r>
+              <a:rPr lang="en-US" b="1" dirty="0">
+                <a:solidFill>
+                  <a:schemeClr val="tx1"/>
+                </a:solidFill>
+              </a:rPr>
+              <a:t>Potential Customers</a:t>
+            </a:r>
+          </a:p>
+        </p:txBody>
+      </p:sp>
+      <p:sp>
+        <p:nvSpPr>
+          <p:cNvPr id="6" name="Content Placeholder 5"/>
+          <p:cNvSpPr>
+            <a:spLocks noGrp="1"/>
+          </p:cNvSpPr>
+          <p:nvPr>
+            <p:ph sz="quarter" idx="4"/>
+          </p:nvPr>
+        </p:nvSpPr>
+        <p:spPr/>
+        <p:txBody>
+          <a:bodyPr/>
+          <a:lstStyle/>
+          <a:p>
+            <a:pPr>
+              <a:buFont typeface="Wingdings" charset="2"/>
+              <a:buChar char="u"/>
+            </a:pPr>
+            <a:r>
+              <a:rPr lang="en-US" dirty="0"/>
+              <a:t>Tech Accelerators/Incubators</a:t>
+            </a:r>
+          </a:p>
+          <a:p>
+            <a:pPr>
+              <a:buFont typeface="Wingdings" charset="2"/>
+              <a:buChar char="u"/>
+            </a:pPr>
+            <a:r>
+              <a:rPr lang="en-US" dirty="0"/>
+              <a:t>Schools (Career counselors)</a:t>
+            </a:r>
+          </a:p>
+          <a:p>
+            <a:pPr>
+              <a:buFont typeface="Wingdings" charset="2"/>
+              <a:buChar char="u"/>
+            </a:pPr>
+            <a:r>
+              <a:rPr lang="en-US" dirty="0"/>
+              <a:t>Organization (Black Girls Code, At The Well</a:t>
+            </a:r>
+          </a:p>
+          <a:p>
+            <a:pPr marL="0" indent="0">
+              <a:buNone/>
+            </a:pPr>
+            <a:r>
+              <a:rPr lang="en-US" dirty="0"/>
+              <a:t>    Her Mind Rocks)</a:t>
+            </a:r>
+          </a:p>
+          <a:p>
+            <a:endParaRPr lang="en-US" dirty="0"/>
+          </a:p>
+        </p:txBody>
+      </p:sp>
+    </p:spTree>
+    <p:extLst>
+      <p:ext uri="{BB962C8B-B14F-4D97-AF65-F5344CB8AC3E}">
+        <p14:creationId xmlns:p14="http://schemas.microsoft.com/office/powerpoint/2010/main" val="3569284364"/>
+      </p:ext>
+    </p:extLst>
+  </p:cSld>
+  <p:clrMapOvr>
+    <a:masterClrMapping/>
+  </p:clrMapOvr>
+</p:sld>
+</file>
+
+<file path=ppt/slides/slide6.xml><?xml version="1.0" encoding="utf-8"?>
+<p:sld xmlns:a="http://schemas.openxmlformats.org/drawingml/2006/main" xmlns:r="http://schemas.openxmlformats.org/officeDocument/2006/relationships" xmlns:p="http://schemas.openxmlformats.org/presentationml/2006/main">
+  <p:cSld>
+    <p:spTree>
+      <p:nvGrpSpPr>
+        <p:cNvPr id="1" name=""/>
+        <p:cNvGrpSpPr/>
+        <p:nvPr/>
+      </p:nvGrpSpPr>
+      <p:grpSpPr>
+        <a:xfrm>
+          <a:off x="0" y="0"/>
+          <a:ext cx="0" cy="0"/>
+          <a:chOff x="0" y="0"/>
+          <a:chExt cx="0" cy="0"/>
+        </a:xfrm>
+      </p:grpSpPr>
+      <p:sp>
+        <p:nvSpPr>
+          <p:cNvPr id="2" name="Title 1"/>
+          <p:cNvSpPr>
+            <a:spLocks noGrp="1"/>
+          </p:cNvSpPr>
+          <p:nvPr>
+            <p:ph type="title"/>
+          </p:nvPr>
+        </p:nvSpPr>
+        <p:spPr/>
+        <p:txBody>
+          <a:bodyPr/>
+          <a:lstStyle/>
+          <a:p>
+            <a:r>
+              <a:rPr lang="en-US" dirty="0"/>
+              <a:t>Next Steps</a:t>
+            </a:r>
+          </a:p>
+        </p:txBody>
+      </p:sp>
+      <p:sp>
+        <p:nvSpPr>
+          <p:cNvPr id="3" name="Text Placeholder 2"/>
+          <p:cNvSpPr>
+            <a:spLocks noGrp="1"/>
+          </p:cNvSpPr>
+          <p:nvPr>
+            <p:ph type="body" idx="1"/>
+          </p:nvPr>
+        </p:nvSpPr>
+        <p:spPr/>
+        <p:txBody>
+          <a:bodyPr/>
+          <a:lstStyle/>
+          <a:p>
+            <a:r>
+              <a:rPr lang="en-US" dirty="0"/>
+              <a:t>Immediate</a:t>
+            </a:r>
+          </a:p>
+        </p:txBody>
+      </p:sp>
+      <p:sp>
+        <p:nvSpPr>
+          <p:cNvPr id="4" name="Content Placeholder 3"/>
+          <p:cNvSpPr>
+            <a:spLocks noGrp="1"/>
+          </p:cNvSpPr>
+          <p:nvPr>
+            <p:ph sz="half" idx="2"/>
+          </p:nvPr>
+        </p:nvSpPr>
+        <p:spPr/>
+        <p:txBody>
+          <a:bodyPr/>
+          <a:lstStyle/>
+          <a:p>
+            <a:pPr marL="0" indent="0">
+              <a:buNone/>
+            </a:pPr>
+            <a:r>
+              <a:rPr lang="en-US" dirty="0"/>
+              <a:t>Complete the application</a:t>
+            </a:r>
+          </a:p>
+          <a:p>
+            <a:pPr>
+              <a:buFontTx/>
+              <a:buChar char="-"/>
+            </a:pPr>
+            <a:r>
+              <a:rPr lang="en-US" dirty="0"/>
+              <a:t>Database of software occupations</a:t>
+            </a:r>
+          </a:p>
+          <a:p>
+            <a:pPr>
+              <a:buFontTx/>
+              <a:buChar char="-"/>
+            </a:pPr>
+            <a:r>
+              <a:rPr lang="en-US" dirty="0"/>
+              <a:t>Database of mentors</a:t>
+            </a:r>
+          </a:p>
+          <a:p>
+            <a:pPr marL="0" indent="0">
+              <a:buNone/>
+            </a:pPr>
+            <a:r>
+              <a:rPr lang="en-US" dirty="0"/>
+              <a:t>Pilot the application in the US (Potential: Women who code, Girls who code, Black Girls Code)</a:t>
+            </a:r>
+          </a:p>
+          <a:p>
+            <a:pPr marL="0" indent="0">
+              <a:buNone/>
+            </a:pPr>
+            <a:r>
+              <a:rPr lang="en-US" dirty="0"/>
+              <a:t>Optimize the app to work with different types of net connectivity</a:t>
+            </a:r>
+          </a:p>
+          <a:p>
+            <a:pPr marL="0" indent="0">
+              <a:buNone/>
+            </a:pPr>
+            <a:endParaRPr lang="en-US" dirty="0"/>
+          </a:p>
+        </p:txBody>
+      </p:sp>
+      <p:sp>
+        <p:nvSpPr>
+          <p:cNvPr id="5" name="Text Placeholder 4"/>
+          <p:cNvSpPr>
+            <a:spLocks noGrp="1"/>
+          </p:cNvSpPr>
+          <p:nvPr>
+            <p:ph type="body" sz="quarter" idx="3"/>
+          </p:nvPr>
+        </p:nvSpPr>
+        <p:spPr/>
+        <p:txBody>
+          <a:bodyPr/>
+          <a:lstStyle/>
+          <a:p>
+            <a:r>
+              <a:rPr lang="en-US" dirty="0"/>
+              <a:t>Long Term</a:t>
+            </a:r>
+          </a:p>
+        </p:txBody>
+      </p:sp>
+      <p:pic>
+        <p:nvPicPr>
+          <p:cNvPr id="7" name="Content Placeholder 6" descr="Screen Shot 2016-08-27 at 2.20.27 PM.png"/>
+          <p:cNvPicPr>
+            <a:picLocks noGrp="1" noChangeAspect="1"/>
+          </p:cNvPicPr>
+          <p:nvPr>
+            <p:ph sz="quarter" idx="4"/>
+          </p:nvPr>
+        </p:nvPicPr>
+        <p:blipFill>
+          <a:blip r:embed="rId2">
+            <a:extLst>
+              <a:ext uri="{28A0092B-C50C-407E-A947-70E740481C1C}">
+                <a14:useLocalDpi xmlns:a14="http://schemas.microsoft.com/office/drawing/2010/main" val="0"/>
+              </a:ext>
+            </a:extLst>
+          </a:blip>
+          <a:srcRect l="2073" r="2073"/>
+          <a:stretch>
+            <a:fillRect/>
+          </a:stretch>
+        </p:blipFill>
+        <p:spPr/>
+      </p:pic>
+    </p:spTree>
+    <p:extLst>
+      <p:ext uri="{BB962C8B-B14F-4D97-AF65-F5344CB8AC3E}">
+        <p14:creationId xmlns:p14="http://schemas.microsoft.com/office/powerpoint/2010/main" val="2804317170"/>
+      </p:ext>
+    </p:extLst>
+  </p:cSld>
+  <p:clrMapOvr>
+    <a:masterClrMapping/>
+  </p:clrMapOvr>
+</p:sld>
+</file>
+
+<file path=ppt/slides/slide7.xml><?xml version="1.0" encoding="utf-8"?>
+<p:sld xmlns:a="http://schemas.openxmlformats.org/drawingml/2006/main" xmlns:r="http://schemas.openxmlformats.org/officeDocument/2006/relationships" xmlns:p="http://schemas.openxmlformats.org/presentationml/2006/main">
+  <p:cSld>
+    <p:spTree>
+      <p:nvGrpSpPr>
+        <p:cNvPr id="1" name=""/>
+        <p:cNvGrpSpPr/>
+        <p:nvPr/>
+      </p:nvGrpSpPr>
+      <p:grpSpPr>
+        <a:xfrm>
+          <a:off x="0" y="0"/>
+          <a:ext cx="0" cy="0"/>
+          <a:chOff x="0" y="0"/>
+          <a:chExt cx="0" cy="0"/>
+        </a:xfrm>
+      </p:grpSpPr>
+      <p:sp>
+        <p:nvSpPr>
+          <p:cNvPr id="2" name="Title 1"/>
+          <p:cNvSpPr>
+            <a:spLocks noGrp="1"/>
+          </p:cNvSpPr>
+          <p:nvPr>
+            <p:ph type="title"/>
+          </p:nvPr>
+        </p:nvSpPr>
+        <p:spPr>
+          <a:xfrm>
+            <a:off x="1097280" y="286603"/>
+            <a:ext cx="9029700" cy="1450757"/>
+          </a:xfrm>
+        </p:spPr>
+        <p:txBody>
+          <a:bodyPr>
+            <a:normAutofit/>
+          </a:bodyPr>
+          <a:lstStyle/>
+          <a:p>
+            <a:pPr algn="ctr"/>
+            <a:r>
+              <a:rPr lang="en-US" dirty="0">
+                <a:solidFill>
+                  <a:srgbClr val="C00000"/>
+                </a:solidFill>
+              </a:rPr>
+              <a:t>“Every child deserves an opportunity to be exposed to technology”</a:t>
+            </a:r>
+          </a:p>
+        </p:txBody>
+      </p:sp>
+      <p:sp>
+        <p:nvSpPr>
+          <p:cNvPr id="3" name="Text Placeholder 2"/>
+          <p:cNvSpPr>
+            <a:spLocks noGrp="1"/>
+          </p:cNvSpPr>
+          <p:nvPr>
+            <p:ph type="body" idx="1"/>
+          </p:nvPr>
+        </p:nvSpPr>
+        <p:spPr>
+          <a:xfrm>
+            <a:off x="1097280" y="1723656"/>
+            <a:ext cx="4937760" cy="736282"/>
+          </a:xfrm>
+        </p:spPr>
+        <p:txBody>
+          <a:bodyPr/>
+          <a:lstStyle/>
+          <a:p>
+            <a:r>
+              <a:rPr lang="en-US" dirty="0" err="1"/>
+              <a:t>Pragyansmita</a:t>
+            </a:r>
+            <a:r>
+              <a:rPr lang="en-US" dirty="0"/>
+              <a:t> </a:t>
+            </a:r>
+            <a:r>
+              <a:rPr lang="en-US" dirty="0" err="1"/>
+              <a:t>Nayak</a:t>
+            </a:r>
+            <a:r>
+              <a:rPr lang="en-US" dirty="0"/>
+              <a:t>, Ph.D</a:t>
+            </a:r>
+          </a:p>
+        </p:txBody>
+      </p:sp>
+      <p:sp>
+        <p:nvSpPr>
+          <p:cNvPr id="5" name="Text Placeholder 4"/>
+          <p:cNvSpPr>
+            <a:spLocks noGrp="1"/>
+          </p:cNvSpPr>
+          <p:nvPr>
+            <p:ph type="body" sz="quarter" idx="3"/>
+          </p:nvPr>
+        </p:nvSpPr>
+        <p:spPr>
+          <a:xfrm>
+            <a:off x="6187316" y="1754255"/>
+            <a:ext cx="4937760" cy="736282"/>
+          </a:xfrm>
+        </p:spPr>
+        <p:txBody>
+          <a:bodyPr/>
+          <a:lstStyle/>
+          <a:p>
+            <a:pPr algn="ctr"/>
+            <a:r>
+              <a:rPr lang="en-US" dirty="0"/>
+              <a:t>Madlene </a:t>
+            </a:r>
+            <a:r>
+              <a:rPr lang="en-US" dirty="0" err="1"/>
+              <a:t>hamilton</a:t>
+            </a:r>
+            <a:r>
+              <a:rPr lang="en-US" dirty="0"/>
+              <a:t>, Ph.D</a:t>
+            </a:r>
+          </a:p>
+        </p:txBody>
+      </p:sp>
+      <p:pic>
+        <p:nvPicPr>
+          <p:cNvPr id="7" name="Content Placeholder 6" descr="IMG_2614.JPG"/>
+          <p:cNvPicPr>
+            <a:picLocks noGrp="1" noChangeAspect="1"/>
+          </p:cNvPicPr>
+          <p:nvPr>
+            <p:ph sz="quarter" idx="4"/>
+          </p:nvPr>
+        </p:nvPicPr>
+        <p:blipFill rotWithShape="1">
+          <a:blip r:embed="rId2">
+            <a:extLst>
+              <a:ext uri="{28A0092B-C50C-407E-A947-70E740481C1C}">
+                <a14:useLocalDpi xmlns:a14="http://schemas.microsoft.com/office/drawing/2010/main" val="0"/>
+              </a:ext>
+            </a:extLst>
+          </a:blip>
+          <a:srcRect l="7806" r="-4804"/>
+          <a:stretch/>
+        </p:blipFill>
+        <p:spPr>
+          <a:xfrm rot="16200000" flipH="1">
+            <a:off x="6813409" y="2764952"/>
+            <a:ext cx="3925795" cy="3168581"/>
+          </a:xfrm>
+        </p:spPr>
+      </p:pic>
+      <p:pic>
+        <p:nvPicPr>
+          <p:cNvPr id="10" name="Content Placeholder 9" descr="Pasted image at 2016_08_27 02_17 PM.png"/>
+          <p:cNvPicPr>
+            <a:picLocks noGrp="1" noChangeAspect="1"/>
+          </p:cNvPicPr>
+          <p:nvPr>
+            <p:ph sz="half" idx="2"/>
+          </p:nvPr>
+        </p:nvPicPr>
+        <p:blipFill>
+          <a:blip r:embed="rId3">
+            <a:extLst>
+              <a:ext uri="{28A0092B-C50C-407E-A947-70E740481C1C}">
+                <a14:useLocalDpi xmlns:a14="http://schemas.microsoft.com/office/drawing/2010/main" val="0"/>
+              </a:ext>
+            </a:extLst>
+          </a:blip>
+          <a:srcRect t="15799" b="15799"/>
+          <a:stretch>
+            <a:fillRect/>
+          </a:stretch>
+        </p:blipFill>
+        <p:spPr>
+          <a:xfrm>
+            <a:off x="923175" y="2463218"/>
+            <a:ext cx="5111865" cy="3497315"/>
+          </a:xfrm>
+        </p:spPr>
+      </p:pic>
+    </p:spTree>
+    <p:extLst>
+      <p:ext uri="{BB962C8B-B14F-4D97-AF65-F5344CB8AC3E}">
+        <p14:creationId xmlns:p14="http://schemas.microsoft.com/office/powerpoint/2010/main" val="16317543"/>
       </p:ext>
     </p:extLst>
   </p:cSld>
@@ -4031,7 +5086,7 @@
     </a:clrScheme>
     <a:fontScheme name="Retrospect">
       <a:majorFont>
-        <a:latin typeface="Calibri Light" panose="020F0302020204030204"/>
+        <a:latin typeface="Calibri Light"/>
         <a:ea typeface=""/>
         <a:cs typeface=""/>
         <a:font script="Jpan" typeface="ＭＳ Ｐゴシック"/>
@@ -4066,7 +5121,7 @@
         <a:font script="Geor" typeface="Sylfaen"/>
       </a:majorFont>
       <a:minorFont>
-        <a:latin typeface="Calibri" panose="020F0502020204030204"/>
+        <a:latin typeface="Calibri"/>
         <a:ea typeface=""/>
         <a:cs typeface=""/>
         <a:font script="Jpan" typeface="ＭＳ Ｐゴシック"/>

</xml_diff>

<commit_message>
Just before the pitch (again!)
</commit_message>
<xml_diff>
--- a/Slides.pptx
+++ b/Slides.pptx
@@ -4,6 +4,9 @@
   <p:sldMasterIdLst>
     <p:sldMasterId id="2147483660" r:id="rId1"/>
   </p:sldMasterIdLst>
+  <p:notesMasterIdLst>
+    <p:notesMasterId r:id="rId9"/>
+  </p:notesMasterIdLst>
   <p:sldIdLst>
     <p:sldId id="261" r:id="rId2"/>
     <p:sldId id="264" r:id="rId3"/>
@@ -129,6 +132,356 @@
 </p:presentation>
 </file>
 
+<file path=ppt/notesMasters/notesMaster1.xml><?xml version="1.0" encoding="utf-8"?>
+<p:notesMaster xmlns:a="http://schemas.openxmlformats.org/drawingml/2006/main" xmlns:r="http://schemas.openxmlformats.org/officeDocument/2006/relationships" xmlns:p="http://schemas.openxmlformats.org/presentationml/2006/main">
+  <p:cSld>
+    <p:bg>
+      <p:bgRef idx="1001">
+        <a:schemeClr val="bg1"/>
+      </p:bgRef>
+    </p:bg>
+    <p:spTree>
+      <p:nvGrpSpPr>
+        <p:cNvPr id="1" name=""/>
+        <p:cNvGrpSpPr/>
+        <p:nvPr/>
+      </p:nvGrpSpPr>
+      <p:grpSpPr>
+        <a:xfrm>
+          <a:off x="0" y="0"/>
+          <a:ext cx="0" cy="0"/>
+          <a:chOff x="0" y="0"/>
+          <a:chExt cx="0" cy="0"/>
+        </a:xfrm>
+      </p:grpSpPr>
+      <p:sp>
+        <p:nvSpPr>
+          <p:cNvPr id="2" name="Header Placeholder 1"/>
+          <p:cNvSpPr>
+            <a:spLocks noGrp="1"/>
+          </p:cNvSpPr>
+          <p:nvPr>
+            <p:ph type="hdr" sz="quarter"/>
+          </p:nvPr>
+        </p:nvSpPr>
+        <p:spPr>
+          <a:xfrm>
+            <a:off x="0" y="0"/>
+            <a:ext cx="2971800" cy="458788"/>
+          </a:xfrm>
+          <a:prstGeom prst="rect">
+            <a:avLst/>
+          </a:prstGeom>
+        </p:spPr>
+        <p:txBody>
+          <a:bodyPr vert="horz" lIns="91440" tIns="45720" rIns="91440" bIns="45720" rtlCol="0"/>
+          <a:lstStyle>
+            <a:lvl1pPr algn="l">
+              <a:defRPr sz="1200"/>
+            </a:lvl1pPr>
+          </a:lstStyle>
+          <a:p>
+            <a:endParaRPr lang="en-US"/>
+          </a:p>
+        </p:txBody>
+      </p:sp>
+      <p:sp>
+        <p:nvSpPr>
+          <p:cNvPr id="3" name="Date Placeholder 2"/>
+          <p:cNvSpPr>
+            <a:spLocks noGrp="1"/>
+          </p:cNvSpPr>
+          <p:nvPr>
+            <p:ph type="dt" idx="1"/>
+          </p:nvPr>
+        </p:nvSpPr>
+        <p:spPr>
+          <a:xfrm>
+            <a:off x="3884613" y="0"/>
+            <a:ext cx="2971800" cy="458788"/>
+          </a:xfrm>
+          <a:prstGeom prst="rect">
+            <a:avLst/>
+          </a:prstGeom>
+        </p:spPr>
+        <p:txBody>
+          <a:bodyPr vert="horz" lIns="91440" tIns="45720" rIns="91440" bIns="45720" rtlCol="0"/>
+          <a:lstStyle>
+            <a:lvl1pPr algn="r">
+              <a:defRPr sz="1200"/>
+            </a:lvl1pPr>
+          </a:lstStyle>
+          <a:p>
+            <a:fld id="{D3FE07A7-661E-4720-80D9-4FC2753FC986}" type="datetimeFigureOut">
+              <a:rPr lang="en-US" smtClean="0"/>
+              <a:t>8/27/2016</a:t>
+            </a:fld>
+            <a:endParaRPr lang="en-US"/>
+          </a:p>
+        </p:txBody>
+      </p:sp>
+      <p:sp>
+        <p:nvSpPr>
+          <p:cNvPr id="4" name="Slide Image Placeholder 3"/>
+          <p:cNvSpPr>
+            <a:spLocks noGrp="1" noRot="1" noChangeAspect="1"/>
+          </p:cNvSpPr>
+          <p:nvPr>
+            <p:ph type="sldImg" idx="2"/>
+          </p:nvPr>
+        </p:nvSpPr>
+        <p:spPr>
+          <a:xfrm>
+            <a:off x="685800" y="1143000"/>
+            <a:ext cx="5486400" cy="3086100"/>
+          </a:xfrm>
+          <a:prstGeom prst="rect">
+            <a:avLst/>
+          </a:prstGeom>
+          <a:noFill/>
+          <a:ln w="12700">
+            <a:solidFill>
+              <a:prstClr val="black"/>
+            </a:solidFill>
+          </a:ln>
+        </p:spPr>
+        <p:txBody>
+          <a:bodyPr vert="horz" lIns="91440" tIns="45720" rIns="91440" bIns="45720" rtlCol="0" anchor="ctr"/>
+          <a:lstStyle/>
+          <a:p>
+            <a:endParaRPr lang="en-US"/>
+          </a:p>
+        </p:txBody>
+      </p:sp>
+      <p:sp>
+        <p:nvSpPr>
+          <p:cNvPr id="5" name="Notes Placeholder 4"/>
+          <p:cNvSpPr>
+            <a:spLocks noGrp="1"/>
+          </p:cNvSpPr>
+          <p:nvPr>
+            <p:ph type="body" sz="quarter" idx="3"/>
+          </p:nvPr>
+        </p:nvSpPr>
+        <p:spPr>
+          <a:xfrm>
+            <a:off x="685800" y="4400550"/>
+            <a:ext cx="5486400" cy="3600450"/>
+          </a:xfrm>
+          <a:prstGeom prst="rect">
+            <a:avLst/>
+          </a:prstGeom>
+        </p:spPr>
+        <p:txBody>
+          <a:bodyPr vert="horz" lIns="91440" tIns="45720" rIns="91440" bIns="45720" rtlCol="0"/>
+          <a:lstStyle/>
+          <a:p>
+            <a:pPr lvl="0"/>
+            <a:r>
+              <a:rPr lang="en-US"/>
+              <a:t>Edit Master text styles</a:t>
+            </a:r>
+          </a:p>
+          <a:p>
+            <a:pPr lvl="1"/>
+            <a:r>
+              <a:rPr lang="en-US"/>
+              <a:t>Second level</a:t>
+            </a:r>
+          </a:p>
+          <a:p>
+            <a:pPr lvl="2"/>
+            <a:r>
+              <a:rPr lang="en-US"/>
+              <a:t>Third level</a:t>
+            </a:r>
+          </a:p>
+          <a:p>
+            <a:pPr lvl="3"/>
+            <a:r>
+              <a:rPr lang="en-US"/>
+              <a:t>Fourth level</a:t>
+            </a:r>
+          </a:p>
+          <a:p>
+            <a:pPr lvl="4"/>
+            <a:r>
+              <a:rPr lang="en-US"/>
+              <a:t>Fifth level</a:t>
+            </a:r>
+            <a:endParaRPr lang="en-US"/>
+          </a:p>
+        </p:txBody>
+      </p:sp>
+      <p:sp>
+        <p:nvSpPr>
+          <p:cNvPr id="6" name="Footer Placeholder 5"/>
+          <p:cNvSpPr>
+            <a:spLocks noGrp="1"/>
+          </p:cNvSpPr>
+          <p:nvPr>
+            <p:ph type="ftr" sz="quarter" idx="4"/>
+          </p:nvPr>
+        </p:nvSpPr>
+        <p:spPr>
+          <a:xfrm>
+            <a:off x="0" y="8685213"/>
+            <a:ext cx="2971800" cy="458787"/>
+          </a:xfrm>
+          <a:prstGeom prst="rect">
+            <a:avLst/>
+          </a:prstGeom>
+        </p:spPr>
+        <p:txBody>
+          <a:bodyPr vert="horz" lIns="91440" tIns="45720" rIns="91440" bIns="45720" rtlCol="0" anchor="b"/>
+          <a:lstStyle>
+            <a:lvl1pPr algn="l">
+              <a:defRPr sz="1200"/>
+            </a:lvl1pPr>
+          </a:lstStyle>
+          <a:p>
+            <a:endParaRPr lang="en-US"/>
+          </a:p>
+        </p:txBody>
+      </p:sp>
+      <p:sp>
+        <p:nvSpPr>
+          <p:cNvPr id="7" name="Slide Number Placeholder 6"/>
+          <p:cNvSpPr>
+            <a:spLocks noGrp="1"/>
+          </p:cNvSpPr>
+          <p:nvPr>
+            <p:ph type="sldNum" sz="quarter" idx="5"/>
+          </p:nvPr>
+        </p:nvSpPr>
+        <p:spPr>
+          <a:xfrm>
+            <a:off x="3884613" y="8685213"/>
+            <a:ext cx="2971800" cy="458787"/>
+          </a:xfrm>
+          <a:prstGeom prst="rect">
+            <a:avLst/>
+          </a:prstGeom>
+        </p:spPr>
+        <p:txBody>
+          <a:bodyPr vert="horz" lIns="91440" tIns="45720" rIns="91440" bIns="45720" rtlCol="0" anchor="b"/>
+          <a:lstStyle>
+            <a:lvl1pPr algn="r">
+              <a:defRPr sz="1200"/>
+            </a:lvl1pPr>
+          </a:lstStyle>
+          <a:p>
+            <a:fld id="{EFF219FE-3F63-483C-B4F4-29FA96D5104D}" type="slidenum">
+              <a:rPr lang="en-US" smtClean="0"/>
+              <a:t>‹#›</a:t>
+            </a:fld>
+            <a:endParaRPr lang="en-US"/>
+          </a:p>
+        </p:txBody>
+      </p:sp>
+    </p:spTree>
+    <p:extLst>
+      <p:ext uri="{BB962C8B-B14F-4D97-AF65-F5344CB8AC3E}">
+        <p14:creationId xmlns:p14="http://schemas.microsoft.com/office/powerpoint/2010/main" val="1961911503"/>
+      </p:ext>
+    </p:extLst>
+  </p:cSld>
+  <p:clrMap bg1="lt1" tx1="dk1" bg2="lt2" tx2="dk2" accent1="accent1" accent2="accent2" accent3="accent3" accent4="accent4" accent5="accent5" accent6="accent6" hlink="hlink" folHlink="folHlink"/>
+  <p:notesStyle>
+    <a:lvl1pPr marL="0" algn="l" defTabSz="914400" rtl="0" eaLnBrk="1" latinLnBrk="0" hangingPunct="1">
+      <a:defRPr sz="1200" kern="1200">
+        <a:solidFill>
+          <a:schemeClr val="tx1"/>
+        </a:solidFill>
+        <a:latin typeface="+mn-lt"/>
+        <a:ea typeface="+mn-ea"/>
+        <a:cs typeface="+mn-cs"/>
+      </a:defRPr>
+    </a:lvl1pPr>
+    <a:lvl2pPr marL="457200" algn="l" defTabSz="914400" rtl="0" eaLnBrk="1" latinLnBrk="0" hangingPunct="1">
+      <a:defRPr sz="1200" kern="1200">
+        <a:solidFill>
+          <a:schemeClr val="tx1"/>
+        </a:solidFill>
+        <a:latin typeface="+mn-lt"/>
+        <a:ea typeface="+mn-ea"/>
+        <a:cs typeface="+mn-cs"/>
+      </a:defRPr>
+    </a:lvl2pPr>
+    <a:lvl3pPr marL="914400" algn="l" defTabSz="914400" rtl="0" eaLnBrk="1" latinLnBrk="0" hangingPunct="1">
+      <a:defRPr sz="1200" kern="1200">
+        <a:solidFill>
+          <a:schemeClr val="tx1"/>
+        </a:solidFill>
+        <a:latin typeface="+mn-lt"/>
+        <a:ea typeface="+mn-ea"/>
+        <a:cs typeface="+mn-cs"/>
+      </a:defRPr>
+    </a:lvl3pPr>
+    <a:lvl4pPr marL="1371600" algn="l" defTabSz="914400" rtl="0" eaLnBrk="1" latinLnBrk="0" hangingPunct="1">
+      <a:defRPr sz="1200" kern="1200">
+        <a:solidFill>
+          <a:schemeClr val="tx1"/>
+        </a:solidFill>
+        <a:latin typeface="+mn-lt"/>
+        <a:ea typeface="+mn-ea"/>
+        <a:cs typeface="+mn-cs"/>
+      </a:defRPr>
+    </a:lvl4pPr>
+    <a:lvl5pPr marL="1828800" algn="l" defTabSz="914400" rtl="0" eaLnBrk="1" latinLnBrk="0" hangingPunct="1">
+      <a:defRPr sz="1200" kern="1200">
+        <a:solidFill>
+          <a:schemeClr val="tx1"/>
+        </a:solidFill>
+        <a:latin typeface="+mn-lt"/>
+        <a:ea typeface="+mn-ea"/>
+        <a:cs typeface="+mn-cs"/>
+      </a:defRPr>
+    </a:lvl5pPr>
+    <a:lvl6pPr marL="2286000" algn="l" defTabSz="914400" rtl="0" eaLnBrk="1" latinLnBrk="0" hangingPunct="1">
+      <a:defRPr sz="1200" kern="1200">
+        <a:solidFill>
+          <a:schemeClr val="tx1"/>
+        </a:solidFill>
+        <a:latin typeface="+mn-lt"/>
+        <a:ea typeface="+mn-ea"/>
+        <a:cs typeface="+mn-cs"/>
+      </a:defRPr>
+    </a:lvl6pPr>
+    <a:lvl7pPr marL="2743200" algn="l" defTabSz="914400" rtl="0" eaLnBrk="1" latinLnBrk="0" hangingPunct="1">
+      <a:defRPr sz="1200" kern="1200">
+        <a:solidFill>
+          <a:schemeClr val="tx1"/>
+        </a:solidFill>
+        <a:latin typeface="+mn-lt"/>
+        <a:ea typeface="+mn-ea"/>
+        <a:cs typeface="+mn-cs"/>
+      </a:defRPr>
+    </a:lvl7pPr>
+    <a:lvl8pPr marL="3200400" algn="l" defTabSz="914400" rtl="0" eaLnBrk="1" latinLnBrk="0" hangingPunct="1">
+      <a:defRPr sz="1200" kern="1200">
+        <a:solidFill>
+          <a:schemeClr val="tx1"/>
+        </a:solidFill>
+        <a:latin typeface="+mn-lt"/>
+        <a:ea typeface="+mn-ea"/>
+        <a:cs typeface="+mn-cs"/>
+      </a:defRPr>
+    </a:lvl8pPr>
+    <a:lvl9pPr marL="3657600" algn="l" defTabSz="914400" rtl="0" eaLnBrk="1" latinLnBrk="0" hangingPunct="1">
+      <a:defRPr sz="1200" kern="1200">
+        <a:solidFill>
+          <a:schemeClr val="tx1"/>
+        </a:solidFill>
+        <a:latin typeface="+mn-lt"/>
+        <a:ea typeface="+mn-ea"/>
+        <a:cs typeface="+mn-cs"/>
+      </a:defRPr>
+    </a:lvl9pPr>
+  </p:notesStyle>
+</p:notesMaster>
+</file>
+
 <file path=ppt/slideLayouts/slideLayout1.xml><?xml version="1.0" encoding="utf-8"?>
 <p:sldLayout xmlns:a="http://schemas.openxmlformats.org/drawingml/2006/main" xmlns:r="http://schemas.openxmlformats.org/officeDocument/2006/relationships" xmlns:p="http://schemas.openxmlformats.org/presentationml/2006/main" showMasterSp="0" type="title" preserve="1">
   <p:cSld name="Title Slide">
@@ -353,7 +706,7 @@
           <a:bodyPr/>
           <a:lstStyle/>
           <a:p>
-            <a:fld id="{48A87A34-81AB-432B-8DAE-1953F412C126}" type="datetimeFigureOut">
+            <a:fld id="{4597F236-0BCD-4606-8A3B-7FC9479C33A6}" type="datetime1">
               <a:rPr lang="en-US" smtClean="0"/>
               <a:t>8/27/2016</a:t>
             </a:fld>
@@ -376,6 +729,10 @@
           <a:bodyPr/>
           <a:lstStyle/>
           <a:p>
+            <a:r>
+              <a:rPr lang="en-US"/>
+              <a:t>Tech "Pen" Pals</a:t>
+            </a:r>
             <a:endParaRPr lang="en-US" dirty="0"/>
           </a:p>
         </p:txBody>
@@ -561,7 +918,7 @@
           <a:bodyPr/>
           <a:lstStyle/>
           <a:p>
-            <a:fld id="{48A87A34-81AB-432B-8DAE-1953F412C126}" type="datetimeFigureOut">
+            <a:fld id="{47185B55-B3E5-4388-A6B7-2FBE4B0886A1}" type="datetime1">
               <a:rPr lang="en-US" smtClean="0"/>
               <a:t>8/27/2016</a:t>
             </a:fld>
@@ -584,6 +941,10 @@
           <a:bodyPr/>
           <a:lstStyle/>
           <a:p>
+            <a:r>
+              <a:rPr lang="en-US"/>
+              <a:t>Tech "Pen" Pals</a:t>
+            </a:r>
             <a:endParaRPr lang="en-US" dirty="0"/>
           </a:p>
         </p:txBody>
@@ -817,7 +1178,7 @@
           <a:bodyPr/>
           <a:lstStyle/>
           <a:p>
-            <a:fld id="{48A87A34-81AB-432B-8DAE-1953F412C126}" type="datetimeFigureOut">
+            <a:fld id="{5DAF3A46-3F14-45BA-9FE3-EC1A6869BC6E}" type="datetime1">
               <a:rPr lang="en-US" smtClean="0"/>
               <a:t>8/27/2016</a:t>
             </a:fld>
@@ -840,6 +1201,10 @@
           <a:bodyPr/>
           <a:lstStyle/>
           <a:p>
+            <a:r>
+              <a:rPr lang="en-US"/>
+              <a:t>Tech "Pen" Pals</a:t>
+            </a:r>
             <a:endParaRPr lang="en-US" dirty="0"/>
           </a:p>
         </p:txBody>
@@ -991,7 +1356,7 @@
           <a:bodyPr/>
           <a:lstStyle/>
           <a:p>
-            <a:fld id="{48A87A34-81AB-432B-8DAE-1953F412C126}" type="datetimeFigureOut">
+            <a:fld id="{B3B995E9-9D83-477A-92A7-C634CF1FB1EA}" type="datetime1">
               <a:rPr lang="en-US" smtClean="0"/>
               <a:t>8/27/2016</a:t>
             </a:fld>
@@ -1014,6 +1379,10 @@
           <a:bodyPr/>
           <a:lstStyle/>
           <a:p>
+            <a:r>
+              <a:rPr lang="en-US"/>
+              <a:t>Tech "Pen" Pals</a:t>
+            </a:r>
             <a:endParaRPr lang="en-US" dirty="0"/>
           </a:p>
         </p:txBody>
@@ -1334,7 +1703,7 @@
           <a:bodyPr/>
           <a:lstStyle/>
           <a:p>
-            <a:fld id="{48A87A34-81AB-432B-8DAE-1953F412C126}" type="datetimeFigureOut">
+            <a:fld id="{C9EC601C-F935-4300-8131-670926F58BA5}" type="datetime1">
               <a:rPr lang="en-US" smtClean="0"/>
               <a:t>8/27/2016</a:t>
             </a:fld>
@@ -1357,6 +1726,10 @@
           <a:bodyPr/>
           <a:lstStyle/>
           <a:p>
+            <a:r>
+              <a:rPr lang="en-US"/>
+              <a:t>Tech "Pen" Pals</a:t>
+            </a:r>
             <a:endParaRPr lang="en-US" dirty="0"/>
           </a:p>
         </p:txBody>
@@ -1609,7 +1982,7 @@
           <a:bodyPr/>
           <a:lstStyle/>
           <a:p>
-            <a:fld id="{48A87A34-81AB-432B-8DAE-1953F412C126}" type="datetimeFigureOut">
+            <a:fld id="{13F1A793-249F-4693-AB85-2277E7F67C30}" type="datetime1">
               <a:rPr lang="en-US" smtClean="0"/>
               <a:t>8/27/2016</a:t>
             </a:fld>
@@ -1632,6 +2005,10 @@
           <a:bodyPr/>
           <a:lstStyle/>
           <a:p>
+            <a:r>
+              <a:rPr lang="en-US"/>
+              <a:t>Tech "Pen" Pals</a:t>
+            </a:r>
             <a:endParaRPr lang="en-US" dirty="0"/>
           </a:p>
         </p:txBody>
@@ -1988,7 +2365,7 @@
           <a:bodyPr/>
           <a:lstStyle/>
           <a:p>
-            <a:fld id="{48A87A34-81AB-432B-8DAE-1953F412C126}" type="datetimeFigureOut">
+            <a:fld id="{815D9B10-C3C0-4703-81C1-C088DBD337FC}" type="datetime1">
               <a:rPr lang="en-US" smtClean="0"/>
               <a:t>8/27/2016</a:t>
             </a:fld>
@@ -2011,6 +2388,10 @@
           <a:bodyPr/>
           <a:lstStyle/>
           <a:p>
+            <a:r>
+              <a:rPr lang="en-US"/>
+              <a:t>Tech "Pen" Pals</a:t>
+            </a:r>
             <a:endParaRPr lang="en-US" dirty="0"/>
           </a:p>
         </p:txBody>
@@ -2106,7 +2487,7 @@
           <a:bodyPr/>
           <a:lstStyle/>
           <a:p>
-            <a:fld id="{48A87A34-81AB-432B-8DAE-1953F412C126}" type="datetimeFigureOut">
+            <a:fld id="{AB2B880F-2512-435A-82A3-46709CDFC4D3}" type="datetime1">
               <a:rPr lang="en-US" smtClean="0"/>
               <a:t>8/27/2016</a:t>
             </a:fld>
@@ -2129,6 +2510,10 @@
           <a:bodyPr/>
           <a:lstStyle/>
           <a:p>
+            <a:r>
+              <a:rPr lang="en-US"/>
+              <a:t>Tech "Pen" Pals</a:t>
+            </a:r>
             <a:endParaRPr lang="en-US" dirty="0"/>
           </a:p>
         </p:txBody>
@@ -2277,7 +2662,7 @@
           <a:bodyPr/>
           <a:lstStyle/>
           <a:p>
-            <a:fld id="{48A87A34-81AB-432B-8DAE-1953F412C126}" type="datetimeFigureOut">
+            <a:fld id="{BF19139D-48EC-457C-A728-B27584A9EAED}" type="datetime1">
               <a:rPr lang="en-US" smtClean="0"/>
               <a:t>8/27/2016</a:t>
             </a:fld>
@@ -2308,6 +2693,10 @@
             </a:lvl1pPr>
           </a:lstStyle>
           <a:p>
+            <a:r>
+              <a:rPr lang="en-US"/>
+              <a:t>Tech "Pen" Pals</a:t>
+            </a:r>
             <a:endParaRPr lang="en-US" dirty="0"/>
           </a:p>
         </p:txBody>
@@ -2631,7 +3020,7 @@
             </a:lvl1pPr>
           </a:lstStyle>
           <a:p>
-            <a:fld id="{48A87A34-81AB-432B-8DAE-1953F412C126}" type="datetimeFigureOut">
+            <a:fld id="{8144CCF8-D299-452F-9B96-6E57A49D3575}" type="datetime1">
               <a:rPr lang="en-US" smtClean="0"/>
               <a:t>8/27/2016</a:t>
             </a:fld>
@@ -2667,6 +3056,10 @@
             </a:lvl1pPr>
           </a:lstStyle>
           <a:p>
+            <a:r>
+              <a:rPr lang="en-US"/>
+              <a:t>Tech "Pen" Pals</a:t>
+            </a:r>
             <a:endParaRPr lang="en-US" dirty="0"/>
           </a:p>
         </p:txBody>
@@ -3013,9 +3406,8 @@
           <a:bodyPr/>
           <a:lstStyle/>
           <a:p>
-            <a:fld id="{48A87A34-81AB-432B-8DAE-1953F412C126}" type="datetimeFigureOut">
+            <a:fld id="{D4D521F4-575C-4FA9-8ED4-12BD125364F0}" type="datetime1">
               <a:rPr lang="en-US" smtClean="0"/>
-              <a:pPr/>
               <a:t>8/27/2016</a:t>
             </a:fld>
             <a:endParaRPr lang="en-US" dirty="0"/>
@@ -3037,6 +3429,10 @@
           <a:bodyPr/>
           <a:lstStyle/>
           <a:p>
+            <a:r>
+              <a:rPr lang="en-US"/>
+              <a:t>Tech "Pen" Pals</a:t>
+            </a:r>
             <a:endParaRPr lang="en-US" dirty="0"/>
           </a:p>
         </p:txBody>
@@ -3301,9 +3697,8 @@
             </a:lvl1pPr>
           </a:lstStyle>
           <a:p>
-            <a:fld id="{48A87A34-81AB-432B-8DAE-1953F412C126}" type="datetimeFigureOut">
+            <a:fld id="{DFE09149-BE39-4055-9EC5-3BD25142D830}" type="datetime1">
               <a:rPr lang="en-US" smtClean="0"/>
-              <a:pPr/>
               <a:t>8/27/2016</a:t>
             </a:fld>
             <a:endParaRPr lang="en-US" dirty="0"/>
@@ -3341,6 +3736,10 @@
             </a:lvl1pPr>
           </a:lstStyle>
           <a:p>
+            <a:r>
+              <a:rPr lang="en-US"/>
+              <a:t>Tech "Pen" Pals</a:t>
+            </a:r>
             <a:endParaRPr lang="en-US" dirty="0"/>
           </a:p>
         </p:txBody>
@@ -3444,6 +3843,7 @@
     <p:sldLayoutId id="2147483670" r:id="rId10"/>
     <p:sldLayoutId id="2147483671" r:id="rId11"/>
   </p:sldLayoutIdLst>
+  <p:hf hdr="0" dt="0"/>
   <p:txStyles>
     <p:titleStyle>
       <a:lvl1pPr algn="l" defTabSz="914400" rtl="0" eaLnBrk="1" latinLnBrk="0" hangingPunct="1">
@@ -3930,7 +4330,7 @@
                 <a:latin typeface="Calibri"/>
                 <a:cs typeface="Calibri"/>
               </a:rPr>
-              <a:t>(Ideas also contributed by Tammy Barbie</a:t>
+              <a:t>(Ideas also contributed by Tammy Barbie)</a:t>
             </a:r>
           </a:p>
         </p:txBody>
@@ -4040,6 +4440,52 @@
         </p:blipFill>
         <p:spPr/>
       </p:pic>
+      <p:sp>
+        <p:nvSpPr>
+          <p:cNvPr id="16" name="Footer Placeholder 15"/>
+          <p:cNvSpPr>
+            <a:spLocks noGrp="1"/>
+          </p:cNvSpPr>
+          <p:nvPr>
+            <p:ph type="ftr" sz="quarter" idx="11"/>
+          </p:nvPr>
+        </p:nvSpPr>
+        <p:spPr/>
+        <p:txBody>
+          <a:bodyPr/>
+          <a:lstStyle/>
+          <a:p>
+            <a:r>
+              <a:rPr lang="en-US"/>
+              <a:t>Tech "Pen" Pals</a:t>
+            </a:r>
+            <a:endParaRPr lang="en-US" dirty="0"/>
+          </a:p>
+        </p:txBody>
+      </p:sp>
+      <p:sp>
+        <p:nvSpPr>
+          <p:cNvPr id="17" name="Slide Number Placeholder 16"/>
+          <p:cNvSpPr>
+            <a:spLocks noGrp="1"/>
+          </p:cNvSpPr>
+          <p:nvPr>
+            <p:ph type="sldNum" sz="quarter" idx="12"/>
+          </p:nvPr>
+        </p:nvSpPr>
+        <p:spPr/>
+        <p:txBody>
+          <a:bodyPr/>
+          <a:lstStyle/>
+          <a:p>
+            <a:fld id="{6D22F896-40B5-4ADD-8801-0D06FADFA095}" type="slidenum">
+              <a:rPr lang="en-US" smtClean="0"/>
+              <a:t>1</a:t>
+            </a:fld>
+            <a:endParaRPr lang="en-US" dirty="0"/>
+          </a:p>
+        </p:txBody>
+      </p:sp>
     </p:spTree>
     <p:extLst>
       <p:ext uri="{BB962C8B-B14F-4D97-AF65-F5344CB8AC3E}">
@@ -4177,6 +4623,52 @@
           </a:p>
         </p:txBody>
       </p:sp>
+      <p:sp>
+        <p:nvSpPr>
+          <p:cNvPr id="4" name="Footer Placeholder 3"/>
+          <p:cNvSpPr>
+            <a:spLocks noGrp="1"/>
+          </p:cNvSpPr>
+          <p:nvPr>
+            <p:ph type="ftr" sz="quarter" idx="11"/>
+          </p:nvPr>
+        </p:nvSpPr>
+        <p:spPr/>
+        <p:txBody>
+          <a:bodyPr/>
+          <a:lstStyle/>
+          <a:p>
+            <a:r>
+              <a:rPr lang="en-US"/>
+              <a:t>Tech "Pen" Pals</a:t>
+            </a:r>
+            <a:endParaRPr lang="en-US" dirty="0"/>
+          </a:p>
+        </p:txBody>
+      </p:sp>
+      <p:sp>
+        <p:nvSpPr>
+          <p:cNvPr id="5" name="Slide Number Placeholder 4"/>
+          <p:cNvSpPr>
+            <a:spLocks noGrp="1"/>
+          </p:cNvSpPr>
+          <p:nvPr>
+            <p:ph type="sldNum" sz="quarter" idx="12"/>
+          </p:nvPr>
+        </p:nvSpPr>
+        <p:spPr/>
+        <p:txBody>
+          <a:bodyPr/>
+          <a:lstStyle/>
+          <a:p>
+            <a:fld id="{6D22F896-40B5-4ADD-8801-0D06FADFA095}" type="slidenum">
+              <a:rPr lang="en-US" smtClean="0"/>
+              <a:t>2</a:t>
+            </a:fld>
+            <a:endParaRPr lang="en-US" dirty="0"/>
+          </a:p>
+        </p:txBody>
+      </p:sp>
     </p:spTree>
     <p:extLst>
       <p:ext uri="{BB962C8B-B14F-4D97-AF65-F5344CB8AC3E}">
@@ -4344,6 +4836,52 @@
             <a:endParaRPr lang="en-US" dirty="0"/>
           </a:p>
           <a:p>
+            <a:endParaRPr lang="en-US" dirty="0"/>
+          </a:p>
+        </p:txBody>
+      </p:sp>
+      <p:sp>
+        <p:nvSpPr>
+          <p:cNvPr id="4" name="Footer Placeholder 3"/>
+          <p:cNvSpPr>
+            <a:spLocks noGrp="1"/>
+          </p:cNvSpPr>
+          <p:nvPr>
+            <p:ph type="ftr" sz="quarter" idx="11"/>
+          </p:nvPr>
+        </p:nvSpPr>
+        <p:spPr/>
+        <p:txBody>
+          <a:bodyPr/>
+          <a:lstStyle/>
+          <a:p>
+            <a:r>
+              <a:rPr lang="en-US"/>
+              <a:t>Tech "Pen" Pals</a:t>
+            </a:r>
+            <a:endParaRPr lang="en-US" dirty="0"/>
+          </a:p>
+        </p:txBody>
+      </p:sp>
+      <p:sp>
+        <p:nvSpPr>
+          <p:cNvPr id="5" name="Slide Number Placeholder 4"/>
+          <p:cNvSpPr>
+            <a:spLocks noGrp="1"/>
+          </p:cNvSpPr>
+          <p:nvPr>
+            <p:ph type="sldNum" sz="quarter" idx="12"/>
+          </p:nvPr>
+        </p:nvSpPr>
+        <p:spPr/>
+        <p:txBody>
+          <a:bodyPr/>
+          <a:lstStyle/>
+          <a:p>
+            <a:fld id="{6D22F896-40B5-4ADD-8801-0D06FADFA095}" type="slidenum">
+              <a:rPr lang="en-US" smtClean="0"/>
+              <a:t>3</a:t>
+            </a:fld>
             <a:endParaRPr lang="en-US" dirty="0"/>
           </a:p>
         </p:txBody>
@@ -4408,6 +4946,52 @@
           </a:prstGeom>
         </p:spPr>
       </p:pic>
+      <p:sp>
+        <p:nvSpPr>
+          <p:cNvPr id="3" name="Footer Placeholder 2"/>
+          <p:cNvSpPr>
+            <a:spLocks noGrp="1"/>
+          </p:cNvSpPr>
+          <p:nvPr>
+            <p:ph type="ftr" sz="quarter" idx="11"/>
+          </p:nvPr>
+        </p:nvSpPr>
+        <p:spPr/>
+        <p:txBody>
+          <a:bodyPr/>
+          <a:lstStyle/>
+          <a:p>
+            <a:r>
+              <a:rPr lang="en-US"/>
+              <a:t>Tech "Pen" Pals</a:t>
+            </a:r>
+            <a:endParaRPr lang="en-US" dirty="0"/>
+          </a:p>
+        </p:txBody>
+      </p:sp>
+      <p:sp>
+        <p:nvSpPr>
+          <p:cNvPr id="4" name="Slide Number Placeholder 3"/>
+          <p:cNvSpPr>
+            <a:spLocks noGrp="1"/>
+          </p:cNvSpPr>
+          <p:nvPr>
+            <p:ph type="sldNum" sz="quarter" idx="12"/>
+          </p:nvPr>
+        </p:nvSpPr>
+        <p:spPr/>
+        <p:txBody>
+          <a:bodyPr/>
+          <a:lstStyle/>
+          <a:p>
+            <a:fld id="{6D22F896-40B5-4ADD-8801-0D06FADFA095}" type="slidenum">
+              <a:rPr lang="en-US" smtClean="0"/>
+              <a:t>4</a:t>
+            </a:fld>
+            <a:endParaRPr lang="en-US" dirty="0"/>
+          </a:p>
+        </p:txBody>
+      </p:sp>
     </p:spTree>
     <p:extLst>
       <p:ext uri="{BB962C8B-B14F-4D97-AF65-F5344CB8AC3E}">
@@ -4643,6 +5227,52 @@
           </a:p>
         </p:txBody>
       </p:sp>
+      <p:sp>
+        <p:nvSpPr>
+          <p:cNvPr id="7" name="Footer Placeholder 6"/>
+          <p:cNvSpPr>
+            <a:spLocks noGrp="1"/>
+          </p:cNvSpPr>
+          <p:nvPr>
+            <p:ph type="ftr" sz="quarter" idx="11"/>
+          </p:nvPr>
+        </p:nvSpPr>
+        <p:spPr/>
+        <p:txBody>
+          <a:bodyPr/>
+          <a:lstStyle/>
+          <a:p>
+            <a:r>
+              <a:rPr lang="en-US"/>
+              <a:t>Tech "Pen" Pals</a:t>
+            </a:r>
+            <a:endParaRPr lang="en-US" dirty="0"/>
+          </a:p>
+        </p:txBody>
+      </p:sp>
+      <p:sp>
+        <p:nvSpPr>
+          <p:cNvPr id="8" name="Slide Number Placeholder 7"/>
+          <p:cNvSpPr>
+            <a:spLocks noGrp="1"/>
+          </p:cNvSpPr>
+          <p:nvPr>
+            <p:ph type="sldNum" sz="quarter" idx="12"/>
+          </p:nvPr>
+        </p:nvSpPr>
+        <p:spPr/>
+        <p:txBody>
+          <a:bodyPr/>
+          <a:lstStyle/>
+          <a:p>
+            <a:fld id="{6D22F896-40B5-4ADD-8801-0D06FADFA095}" type="slidenum">
+              <a:rPr lang="en-US" smtClean="0"/>
+              <a:t>5</a:t>
+            </a:fld>
+            <a:endParaRPr lang="en-US" dirty="0"/>
+          </a:p>
+        </p:txBody>
+      </p:sp>
     </p:spTree>
     <p:extLst>
       <p:ext uri="{BB962C8B-B14F-4D97-AF65-F5344CB8AC3E}">
@@ -4833,6 +5463,52 @@
         </p:blipFill>
         <p:spPr/>
       </p:pic>
+      <p:sp>
+        <p:nvSpPr>
+          <p:cNvPr id="6" name="Footer Placeholder 5"/>
+          <p:cNvSpPr>
+            <a:spLocks noGrp="1"/>
+          </p:cNvSpPr>
+          <p:nvPr>
+            <p:ph type="ftr" sz="quarter" idx="11"/>
+          </p:nvPr>
+        </p:nvSpPr>
+        <p:spPr/>
+        <p:txBody>
+          <a:bodyPr/>
+          <a:lstStyle/>
+          <a:p>
+            <a:r>
+              <a:rPr lang="en-US"/>
+              <a:t>Tech "Pen" Pals</a:t>
+            </a:r>
+            <a:endParaRPr lang="en-US" dirty="0"/>
+          </a:p>
+        </p:txBody>
+      </p:sp>
+      <p:sp>
+        <p:nvSpPr>
+          <p:cNvPr id="8" name="Slide Number Placeholder 7"/>
+          <p:cNvSpPr>
+            <a:spLocks noGrp="1"/>
+          </p:cNvSpPr>
+          <p:nvPr>
+            <p:ph type="sldNum" sz="quarter" idx="12"/>
+          </p:nvPr>
+        </p:nvSpPr>
+        <p:spPr/>
+        <p:txBody>
+          <a:bodyPr/>
+          <a:lstStyle/>
+          <a:p>
+            <a:fld id="{6D22F896-40B5-4ADD-8801-0D06FADFA095}" type="slidenum">
+              <a:rPr lang="en-US" smtClean="0"/>
+              <a:t>6</a:t>
+            </a:fld>
+            <a:endParaRPr lang="en-US" dirty="0"/>
+          </a:p>
+        </p:txBody>
+      </p:sp>
     </p:spTree>
     <p:extLst>
       <p:ext uri="{BB962C8B-B14F-4D97-AF65-F5344CB8AC3E}">
@@ -5030,6 +5706,52 @@
           </a:xfrm>
         </p:spPr>
       </p:pic>
+      <p:sp>
+        <p:nvSpPr>
+          <p:cNvPr id="4" name="Footer Placeholder 3"/>
+          <p:cNvSpPr>
+            <a:spLocks noGrp="1"/>
+          </p:cNvSpPr>
+          <p:nvPr>
+            <p:ph type="ftr" sz="quarter" idx="11"/>
+          </p:nvPr>
+        </p:nvSpPr>
+        <p:spPr/>
+        <p:txBody>
+          <a:bodyPr/>
+          <a:lstStyle/>
+          <a:p>
+            <a:r>
+              <a:rPr lang="en-US"/>
+              <a:t>Tech "Pen" Pals</a:t>
+            </a:r>
+            <a:endParaRPr lang="en-US" dirty="0"/>
+          </a:p>
+        </p:txBody>
+      </p:sp>
+      <p:sp>
+        <p:nvSpPr>
+          <p:cNvPr id="6" name="Slide Number Placeholder 5"/>
+          <p:cNvSpPr>
+            <a:spLocks noGrp="1"/>
+          </p:cNvSpPr>
+          <p:nvPr>
+            <p:ph type="sldNum" sz="quarter" idx="12"/>
+          </p:nvPr>
+        </p:nvSpPr>
+        <p:spPr/>
+        <p:txBody>
+          <a:bodyPr/>
+          <a:lstStyle/>
+          <a:p>
+            <a:fld id="{6D22F896-40B5-4ADD-8801-0D06FADFA095}" type="slidenum">
+              <a:rPr lang="en-US" smtClean="0"/>
+              <a:t>7</a:t>
+            </a:fld>
+            <a:endParaRPr lang="en-US" dirty="0"/>
+          </a:p>
+        </p:txBody>
+      </p:sp>
     </p:spTree>
     <p:extLst>
       <p:ext uri="{BB962C8B-B14F-4D97-AF65-F5344CB8AC3E}">
@@ -5324,4 +6046,299 @@
     </a:ext>
   </a:extLst>
 </a:theme>
+</file>
+
+<file path=ppt/theme/theme2.xml><?xml version="1.0" encoding="utf-8"?>
+<a:theme xmlns:a="http://schemas.openxmlformats.org/drawingml/2006/main" name="Office Theme">
+  <a:themeElements>
+    <a:clrScheme name="Office">
+      <a:dk1>
+        <a:sysClr val="windowText" lastClr="000000"/>
+      </a:dk1>
+      <a:lt1>
+        <a:sysClr val="window" lastClr="FFFFFF"/>
+      </a:lt1>
+      <a:dk2>
+        <a:srgbClr val="44546A"/>
+      </a:dk2>
+      <a:lt2>
+        <a:srgbClr val="E7E6E6"/>
+      </a:lt2>
+      <a:accent1>
+        <a:srgbClr val="5B9BD5"/>
+      </a:accent1>
+      <a:accent2>
+        <a:srgbClr val="ED7D31"/>
+      </a:accent2>
+      <a:accent3>
+        <a:srgbClr val="A5A5A5"/>
+      </a:accent3>
+      <a:accent4>
+        <a:srgbClr val="FFC000"/>
+      </a:accent4>
+      <a:accent5>
+        <a:srgbClr val="4472C4"/>
+      </a:accent5>
+      <a:accent6>
+        <a:srgbClr val="70AD47"/>
+      </a:accent6>
+      <a:hlink>
+        <a:srgbClr val="0563C1"/>
+      </a:hlink>
+      <a:folHlink>
+        <a:srgbClr val="954F72"/>
+      </a:folHlink>
+    </a:clrScheme>
+    <a:fontScheme name="Office">
+      <a:majorFont>
+        <a:latin typeface="Calibri Light" panose="020F0302020204030204"/>
+        <a:ea typeface=""/>
+        <a:cs typeface=""/>
+        <a:font script="Jpan" typeface="游ゴシック Light"/>
+        <a:font script="Hang" typeface="맑은 고딕"/>
+        <a:font script="Hans" typeface="等线 Light"/>
+        <a:font script="Hant" typeface="新細明體"/>
+        <a:font script="Arab" typeface="Times New Roman"/>
+        <a:font script="Hebr" typeface="Times New Roman"/>
+        <a:font script="Thai" typeface="Angsana New"/>
+        <a:font script="Ethi" typeface="Nyala"/>
+        <a:font script="Beng" typeface="Vrinda"/>
+        <a:font script="Gujr" typeface="Shruti"/>
+        <a:font script="Khmr" typeface="MoolBoran"/>
+        <a:font script="Knda" typeface="Tunga"/>
+        <a:font script="Guru" typeface="Raavi"/>
+        <a:font script="Cans" typeface="Euphemia"/>
+        <a:font script="Cher" typeface="Plantagenet Cherokee"/>
+        <a:font script="Yiii" typeface="Microsoft Yi Baiti"/>
+        <a:font script="Tibt" typeface="Microsoft Himalaya"/>
+        <a:font script="Thaa" typeface="MV Boli"/>
+        <a:font script="Deva" typeface="Mangal"/>
+        <a:font script="Telu" typeface="Gautami"/>
+        <a:font script="Taml" typeface="Latha"/>
+        <a:font script="Syrc" typeface="Estrangelo Edessa"/>
+        <a:font script="Orya" typeface="Kalinga"/>
+        <a:font script="Mlym" typeface="Kartika"/>
+        <a:font script="Laoo" typeface="DokChampa"/>
+        <a:font script="Sinh" typeface="Iskoola Pota"/>
+        <a:font script="Mong" typeface="Mongolian Baiti"/>
+        <a:font script="Viet" typeface="Times New Roman"/>
+        <a:font script="Uigh" typeface="Microsoft Uighur"/>
+        <a:font script="Geor" typeface="Sylfaen"/>
+        <a:font script="Armn" typeface="Arial"/>
+        <a:font script="Bugi" typeface="Leelawadee UI"/>
+        <a:font script="Bopo" typeface="Microsoft JhengHei"/>
+        <a:font script="Java" typeface="Javanese Text"/>
+        <a:font script="Lisu" typeface="Segoe UI"/>
+        <a:font script="Mymr" typeface="Myanmar Text"/>
+        <a:font script="Nkoo" typeface="Ebrima"/>
+        <a:font script="Olck" typeface="Nirmala UI"/>
+        <a:font script="Osma" typeface="Ebrima"/>
+        <a:font script="Phag" typeface="Phagspa"/>
+        <a:font script="Syrn" typeface="Estrangelo Edessa"/>
+        <a:font script="Syrj" typeface="Estrangelo Edessa"/>
+        <a:font script="Syre" typeface="Estrangelo Edessa"/>
+        <a:font script="Sora" typeface="Nirmala UI"/>
+        <a:font script="Tale" typeface="Microsoft Tai Le"/>
+        <a:font script="Talu" typeface="Microsoft New Tai Lue"/>
+        <a:font script="Tfng" typeface="Ebrima"/>
+      </a:majorFont>
+      <a:minorFont>
+        <a:latin typeface="Calibri" panose="020F0502020204030204"/>
+        <a:ea typeface=""/>
+        <a:cs typeface=""/>
+        <a:font script="Jpan" typeface="游ゴシック"/>
+        <a:font script="Hang" typeface="맑은 고딕"/>
+        <a:font script="Hans" typeface="等线"/>
+        <a:font script="Hant" typeface="新細明體"/>
+        <a:font script="Arab" typeface="Arial"/>
+        <a:font script="Hebr" typeface="Arial"/>
+        <a:font script="Thai" typeface="Cordia New"/>
+        <a:font script="Ethi" typeface="Nyala"/>
+        <a:font script="Beng" typeface="Vrinda"/>
+        <a:font script="Gujr" typeface="Shruti"/>
+        <a:font script="Khmr" typeface="DaunPenh"/>
+        <a:font script="Knda" typeface="Tunga"/>
+        <a:font script="Guru" typeface="Raavi"/>
+        <a:font script="Cans" typeface="Euphemia"/>
+        <a:font script="Cher" typeface="Plantagenet Cherokee"/>
+        <a:font script="Yiii" typeface="Microsoft Yi Baiti"/>
+        <a:font script="Tibt" typeface="Microsoft Himalaya"/>
+        <a:font script="Thaa" typeface="MV Boli"/>
+        <a:font script="Deva" typeface="Mangal"/>
+        <a:font script="Telu" typeface="Gautami"/>
+        <a:font script="Taml" typeface="Latha"/>
+        <a:font script="Syrc" typeface="Estrangelo Edessa"/>
+        <a:font script="Orya" typeface="Kalinga"/>
+        <a:font script="Mlym" typeface="Kartika"/>
+        <a:font script="Laoo" typeface="DokChampa"/>
+        <a:font script="Sinh" typeface="Iskoola Pota"/>
+        <a:font script="Mong" typeface="Mongolian Baiti"/>
+        <a:font script="Viet" typeface="Arial"/>
+        <a:font script="Uigh" typeface="Microsoft Uighur"/>
+        <a:font script="Geor" typeface="Sylfaen"/>
+        <a:font script="Armn" typeface="Arial"/>
+        <a:font script="Bugi" typeface="Leelawadee UI"/>
+        <a:font script="Bopo" typeface="Microsoft JhengHei"/>
+        <a:font script="Java" typeface="Javanese Text"/>
+        <a:font script="Lisu" typeface="Segoe UI"/>
+        <a:font script="Mymr" typeface="Myanmar Text"/>
+        <a:font script="Nkoo" typeface="Ebrima"/>
+        <a:font script="Olck" typeface="Nirmala UI"/>
+        <a:font script="Osma" typeface="Ebrima"/>
+        <a:font script="Phag" typeface="Phagspa"/>
+        <a:font script="Syrn" typeface="Estrangelo Edessa"/>
+        <a:font script="Syrj" typeface="Estrangelo Edessa"/>
+        <a:font script="Syre" typeface="Estrangelo Edessa"/>
+        <a:font script="Sora" typeface="Nirmala UI"/>
+        <a:font script="Tale" typeface="Microsoft Tai Le"/>
+        <a:font script="Talu" typeface="Microsoft New Tai Lue"/>
+        <a:font script="Tfng" typeface="Ebrima"/>
+      </a:minorFont>
+    </a:fontScheme>
+    <a:fmtScheme name="Office">
+      <a:fillStyleLst>
+        <a:solidFill>
+          <a:schemeClr val="phClr"/>
+        </a:solidFill>
+        <a:gradFill rotWithShape="1">
+          <a:gsLst>
+            <a:gs pos="0">
+              <a:schemeClr val="phClr">
+                <a:lumMod val="110000"/>
+                <a:satMod val="105000"/>
+                <a:tint val="67000"/>
+              </a:schemeClr>
+            </a:gs>
+            <a:gs pos="50000">
+              <a:schemeClr val="phClr">
+                <a:lumMod val="105000"/>
+                <a:satMod val="103000"/>
+                <a:tint val="73000"/>
+              </a:schemeClr>
+            </a:gs>
+            <a:gs pos="100000">
+              <a:schemeClr val="phClr">
+                <a:lumMod val="105000"/>
+                <a:satMod val="109000"/>
+                <a:tint val="81000"/>
+              </a:schemeClr>
+            </a:gs>
+          </a:gsLst>
+          <a:lin ang="5400000" scaled="0"/>
+        </a:gradFill>
+        <a:gradFill rotWithShape="1">
+          <a:gsLst>
+            <a:gs pos="0">
+              <a:schemeClr val="phClr">
+                <a:satMod val="103000"/>
+                <a:lumMod val="102000"/>
+                <a:tint val="94000"/>
+              </a:schemeClr>
+            </a:gs>
+            <a:gs pos="50000">
+              <a:schemeClr val="phClr">
+                <a:satMod val="110000"/>
+                <a:lumMod val="100000"/>
+                <a:shade val="100000"/>
+              </a:schemeClr>
+            </a:gs>
+            <a:gs pos="100000">
+              <a:schemeClr val="phClr">
+                <a:lumMod val="99000"/>
+                <a:satMod val="120000"/>
+                <a:shade val="78000"/>
+              </a:schemeClr>
+            </a:gs>
+          </a:gsLst>
+          <a:lin ang="5400000" scaled="0"/>
+        </a:gradFill>
+      </a:fillStyleLst>
+      <a:lnStyleLst>
+        <a:ln w="6350" cap="flat" cmpd="sng" algn="ctr">
+          <a:solidFill>
+            <a:schemeClr val="phClr"/>
+          </a:solidFill>
+          <a:prstDash val="solid"/>
+          <a:miter lim="800000"/>
+        </a:ln>
+        <a:ln w="12700" cap="flat" cmpd="sng" algn="ctr">
+          <a:solidFill>
+            <a:schemeClr val="phClr"/>
+          </a:solidFill>
+          <a:prstDash val="solid"/>
+          <a:miter lim="800000"/>
+        </a:ln>
+        <a:ln w="19050" cap="flat" cmpd="sng" algn="ctr">
+          <a:solidFill>
+            <a:schemeClr val="phClr"/>
+          </a:solidFill>
+          <a:prstDash val="solid"/>
+          <a:miter lim="800000"/>
+        </a:ln>
+      </a:lnStyleLst>
+      <a:effectStyleLst>
+        <a:effectStyle>
+          <a:effectLst/>
+        </a:effectStyle>
+        <a:effectStyle>
+          <a:effectLst/>
+        </a:effectStyle>
+        <a:effectStyle>
+          <a:effectLst>
+            <a:outerShdw blurRad="57150" dist="19050" dir="5400000" algn="ctr" rotWithShape="0">
+              <a:srgbClr val="000000">
+                <a:alpha val="63000"/>
+              </a:srgbClr>
+            </a:outerShdw>
+          </a:effectLst>
+        </a:effectStyle>
+      </a:effectStyleLst>
+      <a:bgFillStyleLst>
+        <a:solidFill>
+          <a:schemeClr val="phClr"/>
+        </a:solidFill>
+        <a:solidFill>
+          <a:schemeClr val="phClr">
+            <a:tint val="95000"/>
+            <a:satMod val="170000"/>
+          </a:schemeClr>
+        </a:solidFill>
+        <a:gradFill rotWithShape="1">
+          <a:gsLst>
+            <a:gs pos="0">
+              <a:schemeClr val="phClr">
+                <a:tint val="93000"/>
+                <a:satMod val="150000"/>
+                <a:shade val="98000"/>
+                <a:lumMod val="102000"/>
+              </a:schemeClr>
+            </a:gs>
+            <a:gs pos="50000">
+              <a:schemeClr val="phClr">
+                <a:tint val="98000"/>
+                <a:satMod val="130000"/>
+                <a:shade val="90000"/>
+                <a:lumMod val="103000"/>
+              </a:schemeClr>
+            </a:gs>
+            <a:gs pos="100000">
+              <a:schemeClr val="phClr">
+                <a:shade val="63000"/>
+                <a:satMod val="120000"/>
+              </a:schemeClr>
+            </a:gs>
+          </a:gsLst>
+          <a:lin ang="5400000" scaled="0"/>
+        </a:gradFill>
+      </a:bgFillStyleLst>
+    </a:fmtScheme>
+  </a:themeElements>
+  <a:objectDefaults/>
+  <a:extraClrSchemeLst/>
+  <a:extLst>
+    <a:ext uri="{05A4C25C-085E-4340-85A3-A5531E510DB2}">
+      <thm15:themeFamily xmlns:thm15="http://schemas.microsoft.com/office/thememl/2012/main" name="Office Theme" id="{62F939B6-93AF-4DB8-9C6B-D6C7DFDC589F}" vid="{4A3C46E8-61CC-4603-A589-7422A47A8E4A}"/>
+    </a:ext>
+  </a:extLst>
+</a:theme>
 </file>
</xml_diff>